<commit_message>
Cybersecurity Lessons from the Movie Titanic
</commit_message>
<xml_diff>
--- a/2023-0930-BSIDES_CT.pptx
+++ b/2023-0930-BSIDES_CT.pptx
@@ -547,7 +547,7 @@
           <a:noFill/>
           <a:extLst>
             <a:ext uri="{909E8E84-426E-40dd-AFC4-6F175D3DCCD1}">
-              <a14:hiddenFill xmlns:a14="http://schemas.microsoft.com/office/drawing/2010/main" xmlns="">
+              <a14:hiddenFill xmlns="" xmlns:a14="http://schemas.microsoft.com/office/drawing/2010/main">
                 <a:solidFill>
                   <a:srgbClr val="FFFFFF"/>
                 </a:solidFill>
@@ -607,7 +607,7 @@
             </a:ln>
             <a:extLst>
               <a:ext uri="{91240B29-F687-4f45-9708-019B960494DF}">
-                <a14:hiddenLine xmlns:a14="http://schemas.microsoft.com/office/drawing/2010/main" xmlns="" w="9525">
+                <a14:hiddenLine xmlns="" xmlns:a14="http://schemas.microsoft.com/office/drawing/2010/main" w="9525">
                   <a:solidFill>
                     <a:srgbClr val="000000"/>
                   </a:solidFill>
@@ -697,7 +697,7 @@
             </a:ln>
             <a:extLst>
               <a:ext uri="{91240B29-F687-4f45-9708-019B960494DF}">
-                <a14:hiddenLine xmlns:a14="http://schemas.microsoft.com/office/drawing/2010/main" xmlns="" w="9525">
+                <a14:hiddenLine xmlns="" xmlns:a14="http://schemas.microsoft.com/office/drawing/2010/main" w="9525">
                   <a:solidFill>
                     <a:srgbClr val="000000"/>
                   </a:solidFill>
@@ -787,7 +787,7 @@
             </a:ln>
             <a:extLst>
               <a:ext uri="{91240B29-F687-4f45-9708-019B960494DF}">
-                <a14:hiddenLine xmlns:a14="http://schemas.microsoft.com/office/drawing/2010/main" xmlns="" w="9525">
+                <a14:hiddenLine xmlns="" xmlns:a14="http://schemas.microsoft.com/office/drawing/2010/main" w="9525">
                   <a:solidFill>
                     <a:srgbClr val="000000"/>
                   </a:solidFill>
@@ -821,7 +821,7 @@
             </a:ln>
             <a:extLst>
               <a:ext uri="{91240B29-F687-4f45-9708-019B960494DF}">
-                <a14:hiddenLine xmlns:a14="http://schemas.microsoft.com/office/drawing/2010/main" xmlns="" w="9525">
+                <a14:hiddenLine xmlns="" xmlns:a14="http://schemas.microsoft.com/office/drawing/2010/main" w="9525">
                   <a:solidFill>
                     <a:srgbClr val="000000"/>
                   </a:solidFill>
@@ -911,7 +911,7 @@
             </a:ln>
             <a:extLst>
               <a:ext uri="{91240B29-F687-4f45-9708-019B960494DF}">
-                <a14:hiddenLine xmlns:a14="http://schemas.microsoft.com/office/drawing/2010/main" xmlns="" w="9525">
+                <a14:hiddenLine xmlns="" xmlns:a14="http://schemas.microsoft.com/office/drawing/2010/main" w="9525">
                   <a:solidFill>
                     <a:srgbClr val="000000"/>
                   </a:solidFill>
@@ -973,7 +973,7 @@
             </a:ln>
             <a:extLst>
               <a:ext uri="{91240B29-F687-4f45-9708-019B960494DF}">
-                <a14:hiddenLine xmlns:a14="http://schemas.microsoft.com/office/drawing/2010/main" xmlns="" w="9525">
+                <a14:hiddenLine xmlns="" xmlns:a14="http://schemas.microsoft.com/office/drawing/2010/main" w="9525">
                   <a:solidFill>
                     <a:srgbClr val="000000"/>
                   </a:solidFill>
@@ -1035,7 +1035,7 @@
             </a:ln>
             <a:extLst>
               <a:ext uri="{91240B29-F687-4f45-9708-019B960494DF}">
-                <a14:hiddenLine xmlns:a14="http://schemas.microsoft.com/office/drawing/2010/main" xmlns="" w="9525">
+                <a14:hiddenLine xmlns="" xmlns:a14="http://schemas.microsoft.com/office/drawing/2010/main" w="9525">
                   <a:solidFill>
                     <a:srgbClr val="000000"/>
                   </a:solidFill>
@@ -1125,7 +1125,7 @@
             </a:ln>
             <a:extLst>
               <a:ext uri="{91240B29-F687-4f45-9708-019B960494DF}">
-                <a14:hiddenLine xmlns:a14="http://schemas.microsoft.com/office/drawing/2010/main" xmlns="" w="9525">
+                <a14:hiddenLine xmlns="" xmlns:a14="http://schemas.microsoft.com/office/drawing/2010/main" w="9525">
                   <a:solidFill>
                     <a:srgbClr val="000000"/>
                   </a:solidFill>
@@ -1187,7 +1187,7 @@
             </a:ln>
             <a:extLst>
               <a:ext uri="{91240B29-F687-4f45-9708-019B960494DF}">
-                <a14:hiddenLine xmlns:a14="http://schemas.microsoft.com/office/drawing/2010/main" xmlns="" w="9525">
+                <a14:hiddenLine xmlns="" xmlns:a14="http://schemas.microsoft.com/office/drawing/2010/main" w="9525">
                   <a:solidFill>
                     <a:srgbClr val="000000"/>
                   </a:solidFill>
@@ -1249,7 +1249,7 @@
             </a:ln>
             <a:extLst>
               <a:ext uri="{91240B29-F687-4f45-9708-019B960494DF}">
-                <a14:hiddenLine xmlns:a14="http://schemas.microsoft.com/office/drawing/2010/main" xmlns="" w="9525">
+                <a14:hiddenLine xmlns="" xmlns:a14="http://schemas.microsoft.com/office/drawing/2010/main" w="9525">
                   <a:solidFill>
                     <a:srgbClr val="000000"/>
                   </a:solidFill>
@@ -1339,7 +1339,7 @@
             </a:ln>
             <a:extLst>
               <a:ext uri="{91240B29-F687-4f45-9708-019B960494DF}">
-                <a14:hiddenLine xmlns:a14="http://schemas.microsoft.com/office/drawing/2010/main" xmlns="" w="9525">
+                <a14:hiddenLine xmlns="" xmlns:a14="http://schemas.microsoft.com/office/drawing/2010/main" w="9525">
                   <a:solidFill>
                     <a:srgbClr val="000000"/>
                   </a:solidFill>
@@ -1429,7 +1429,7 @@
             </a:ln>
             <a:extLst>
               <a:ext uri="{91240B29-F687-4f45-9708-019B960494DF}">
-                <a14:hiddenLine xmlns:a14="http://schemas.microsoft.com/office/drawing/2010/main" xmlns="" w="9525">
+                <a14:hiddenLine xmlns="" xmlns:a14="http://schemas.microsoft.com/office/drawing/2010/main" w="9525">
                   <a:solidFill>
                     <a:srgbClr val="000000"/>
                   </a:solidFill>
@@ -1491,7 +1491,7 @@
             </a:ln>
             <a:extLst>
               <a:ext uri="{91240B29-F687-4f45-9708-019B960494DF}">
-                <a14:hiddenLine xmlns:a14="http://schemas.microsoft.com/office/drawing/2010/main" xmlns="" w="9525">
+                <a14:hiddenLine xmlns="" xmlns:a14="http://schemas.microsoft.com/office/drawing/2010/main" w="9525">
                   <a:solidFill>
                     <a:srgbClr val="000000"/>
                   </a:solidFill>
@@ -1601,7 +1601,7 @@
             </a:ln>
             <a:extLst>
               <a:ext uri="{91240B29-F687-4f45-9708-019B960494DF}">
-                <a14:hiddenLine xmlns:a14="http://schemas.microsoft.com/office/drawing/2010/main" xmlns="" w="9525">
+                <a14:hiddenLine xmlns="" xmlns:a14="http://schemas.microsoft.com/office/drawing/2010/main" w="9525">
                   <a:solidFill>
                     <a:srgbClr val="000000"/>
                   </a:solidFill>
@@ -1663,7 +1663,7 @@
             </a:ln>
             <a:extLst>
               <a:ext uri="{91240B29-F687-4f45-9708-019B960494DF}">
-                <a14:hiddenLine xmlns:a14="http://schemas.microsoft.com/office/drawing/2010/main" xmlns="" w="9525">
+                <a14:hiddenLine xmlns="" xmlns:a14="http://schemas.microsoft.com/office/drawing/2010/main" w="9525">
                   <a:solidFill>
                     <a:srgbClr val="000000"/>
                   </a:solidFill>
@@ -1753,7 +1753,7 @@
             </a:ln>
             <a:extLst>
               <a:ext uri="{91240B29-F687-4f45-9708-019B960494DF}">
-                <a14:hiddenLine xmlns:a14="http://schemas.microsoft.com/office/drawing/2010/main" xmlns="" w="9525">
+                <a14:hiddenLine xmlns="" xmlns:a14="http://schemas.microsoft.com/office/drawing/2010/main" w="9525">
                   <a:solidFill>
                     <a:srgbClr val="000000"/>
                   </a:solidFill>
@@ -1843,7 +1843,7 @@
             </a:ln>
             <a:extLst>
               <a:ext uri="{91240B29-F687-4f45-9708-019B960494DF}">
-                <a14:hiddenLine xmlns:a14="http://schemas.microsoft.com/office/drawing/2010/main" xmlns="" w="9525">
+                <a14:hiddenLine xmlns="" xmlns:a14="http://schemas.microsoft.com/office/drawing/2010/main" w="9525">
                   <a:solidFill>
                     <a:srgbClr val="000000"/>
                   </a:solidFill>
@@ -1905,7 +1905,7 @@
             </a:ln>
             <a:extLst>
               <a:ext uri="{91240B29-F687-4f45-9708-019B960494DF}">
-                <a14:hiddenLine xmlns:a14="http://schemas.microsoft.com/office/drawing/2010/main" xmlns="" w="9525">
+                <a14:hiddenLine xmlns="" xmlns:a14="http://schemas.microsoft.com/office/drawing/2010/main" w="9525">
                   <a:solidFill>
                     <a:srgbClr val="000000"/>
                   </a:solidFill>
@@ -1995,7 +1995,7 @@
             </a:ln>
             <a:extLst>
               <a:ext uri="{91240B29-F687-4f45-9708-019B960494DF}">
-                <a14:hiddenLine xmlns:a14="http://schemas.microsoft.com/office/drawing/2010/main" xmlns="" w="9525">
+                <a14:hiddenLine xmlns="" xmlns:a14="http://schemas.microsoft.com/office/drawing/2010/main" w="9525">
                   <a:solidFill>
                     <a:srgbClr val="000000"/>
                   </a:solidFill>
@@ -2085,7 +2085,7 @@
             </a:ln>
             <a:extLst>
               <a:ext uri="{91240B29-F687-4f45-9708-019B960494DF}">
-                <a14:hiddenLine xmlns:a14="http://schemas.microsoft.com/office/drawing/2010/main" xmlns="" w="9525">
+                <a14:hiddenLine xmlns="" xmlns:a14="http://schemas.microsoft.com/office/drawing/2010/main" w="9525">
                   <a:solidFill>
                     <a:srgbClr val="000000"/>
                   </a:solidFill>
@@ -2141,7 +2141,7 @@
             </a:ln>
             <a:extLst>
               <a:ext uri="{91240B29-F687-4f45-9708-019B960494DF}">
-                <a14:hiddenLine xmlns:a14="http://schemas.microsoft.com/office/drawing/2010/main" xmlns="" w="9525">
+                <a14:hiddenLine xmlns="" xmlns:a14="http://schemas.microsoft.com/office/drawing/2010/main" w="9525">
                   <a:solidFill>
                     <a:srgbClr val="000000"/>
                   </a:solidFill>
@@ -2231,7 +2231,7 @@
             </a:ln>
             <a:extLst>
               <a:ext uri="{91240B29-F687-4f45-9708-019B960494DF}">
-                <a14:hiddenLine xmlns:a14="http://schemas.microsoft.com/office/drawing/2010/main" xmlns="" w="9525">
+                <a14:hiddenLine xmlns="" xmlns:a14="http://schemas.microsoft.com/office/drawing/2010/main" w="9525">
                   <a:solidFill>
                     <a:srgbClr val="000000"/>
                   </a:solidFill>
@@ -2287,7 +2287,7 @@
             </a:ln>
             <a:extLst>
               <a:ext uri="{91240B29-F687-4f45-9708-019B960494DF}">
-                <a14:hiddenLine xmlns:a14="http://schemas.microsoft.com/office/drawing/2010/main" xmlns="" w="9525">
+                <a14:hiddenLine xmlns="" xmlns:a14="http://schemas.microsoft.com/office/drawing/2010/main" w="9525">
                   <a:solidFill>
                     <a:srgbClr val="000000"/>
                   </a:solidFill>
@@ -2377,7 +2377,7 @@
             </a:ln>
             <a:extLst>
               <a:ext uri="{91240B29-F687-4f45-9708-019B960494DF}">
-                <a14:hiddenLine xmlns:a14="http://schemas.microsoft.com/office/drawing/2010/main" xmlns="" w="9525">
+                <a14:hiddenLine xmlns="" xmlns:a14="http://schemas.microsoft.com/office/drawing/2010/main" w="9525">
                   <a:solidFill>
                     <a:srgbClr val="000000"/>
                   </a:solidFill>
@@ -2445,7 +2445,7 @@
             </a:ln>
             <a:extLst>
               <a:ext uri="{91240B29-F687-4f45-9708-019B960494DF}">
-                <a14:hiddenLine xmlns:a14="http://schemas.microsoft.com/office/drawing/2010/main" xmlns="" w="9525">
+                <a14:hiddenLine xmlns="" xmlns:a14="http://schemas.microsoft.com/office/drawing/2010/main" w="9525">
                   <a:solidFill>
                     <a:srgbClr val="000000"/>
                   </a:solidFill>
@@ -2535,7 +2535,7 @@
             </a:ln>
             <a:extLst>
               <a:ext uri="{91240B29-F687-4f45-9708-019B960494DF}">
-                <a14:hiddenLine xmlns:a14="http://schemas.microsoft.com/office/drawing/2010/main" xmlns="" w="9525">
+                <a14:hiddenLine xmlns="" xmlns:a14="http://schemas.microsoft.com/office/drawing/2010/main" w="9525">
                   <a:solidFill>
                     <a:srgbClr val="000000"/>
                   </a:solidFill>
@@ -2603,7 +2603,7 @@
             </a:ln>
             <a:extLst>
               <a:ext uri="{91240B29-F687-4f45-9708-019B960494DF}">
-                <a14:hiddenLine xmlns:a14="http://schemas.microsoft.com/office/drawing/2010/main" xmlns="" w="9525">
+                <a14:hiddenLine xmlns="" xmlns:a14="http://schemas.microsoft.com/office/drawing/2010/main" w="9525">
                   <a:solidFill>
                     <a:srgbClr val="000000"/>
                   </a:solidFill>
@@ -2693,7 +2693,7 @@
             </a:ln>
             <a:extLst>
               <a:ext uri="{91240B29-F687-4f45-9708-019B960494DF}">
-                <a14:hiddenLine xmlns:a14="http://schemas.microsoft.com/office/drawing/2010/main" xmlns="" w="9525">
+                <a14:hiddenLine xmlns="" xmlns:a14="http://schemas.microsoft.com/office/drawing/2010/main" w="9525">
                   <a:solidFill>
                     <a:srgbClr val="000000"/>
                   </a:solidFill>
@@ -2727,7 +2727,7 @@
             </a:ln>
             <a:extLst>
               <a:ext uri="{91240B29-F687-4f45-9708-019B960494DF}">
-                <a14:hiddenLine xmlns:a14="http://schemas.microsoft.com/office/drawing/2010/main" xmlns="" w="9525">
+                <a14:hiddenLine xmlns="" xmlns:a14="http://schemas.microsoft.com/office/drawing/2010/main" w="9525">
                   <a:solidFill>
                     <a:srgbClr val="000000"/>
                   </a:solidFill>
@@ -2817,7 +2817,7 @@
             </a:ln>
             <a:extLst>
               <a:ext uri="{91240B29-F687-4f45-9708-019B960494DF}">
-                <a14:hiddenLine xmlns:a14="http://schemas.microsoft.com/office/drawing/2010/main" xmlns="" w="9525">
+                <a14:hiddenLine xmlns="" xmlns:a14="http://schemas.microsoft.com/office/drawing/2010/main" w="9525">
                   <a:solidFill>
                     <a:srgbClr val="000000"/>
                   </a:solidFill>
@@ -2879,7 +2879,7 @@
             </a:ln>
             <a:extLst>
               <a:ext uri="{91240B29-F687-4f45-9708-019B960494DF}">
-                <a14:hiddenLine xmlns:a14="http://schemas.microsoft.com/office/drawing/2010/main" xmlns="" w="9525">
+                <a14:hiddenLine xmlns="" xmlns:a14="http://schemas.microsoft.com/office/drawing/2010/main" w="9525">
                   <a:solidFill>
                     <a:srgbClr val="000000"/>
                   </a:solidFill>
@@ -2941,7 +2941,7 @@
             </a:ln>
             <a:extLst>
               <a:ext uri="{91240B29-F687-4f45-9708-019B960494DF}">
-                <a14:hiddenLine xmlns:a14="http://schemas.microsoft.com/office/drawing/2010/main" xmlns="" w="9525">
+                <a14:hiddenLine xmlns="" xmlns:a14="http://schemas.microsoft.com/office/drawing/2010/main" w="9525">
                   <a:solidFill>
                     <a:srgbClr val="000000"/>
                   </a:solidFill>
@@ -3031,7 +3031,7 @@
             </a:ln>
             <a:extLst>
               <a:ext uri="{91240B29-F687-4f45-9708-019B960494DF}">
-                <a14:hiddenLine xmlns:a14="http://schemas.microsoft.com/office/drawing/2010/main" xmlns="" w="9525">
+                <a14:hiddenLine xmlns="" xmlns:a14="http://schemas.microsoft.com/office/drawing/2010/main" w="9525">
                   <a:solidFill>
                     <a:srgbClr val="000000"/>
                   </a:solidFill>
@@ -3099,7 +3099,7 @@
             </a:ln>
             <a:extLst>
               <a:ext uri="{91240B29-F687-4f45-9708-019B960494DF}">
-                <a14:hiddenLine xmlns:a14="http://schemas.microsoft.com/office/drawing/2010/main" xmlns="" w="9525">
+                <a14:hiddenLine xmlns="" xmlns:a14="http://schemas.microsoft.com/office/drawing/2010/main" w="9525">
                   <a:solidFill>
                     <a:srgbClr val="000000"/>
                   </a:solidFill>
@@ -3161,7 +3161,7 @@
             </a:ln>
             <a:extLst>
               <a:ext uri="{91240B29-F687-4f45-9708-019B960494DF}">
-                <a14:hiddenLine xmlns:a14="http://schemas.microsoft.com/office/drawing/2010/main" xmlns="" w="9525">
+                <a14:hiddenLine xmlns="" xmlns:a14="http://schemas.microsoft.com/office/drawing/2010/main" w="9525">
                   <a:solidFill>
                     <a:srgbClr val="000000"/>
                   </a:solidFill>
@@ -3251,7 +3251,7 @@
             </a:ln>
             <a:extLst>
               <a:ext uri="{91240B29-F687-4f45-9708-019B960494DF}">
-                <a14:hiddenLine xmlns:a14="http://schemas.microsoft.com/office/drawing/2010/main" xmlns="" w="9525">
+                <a14:hiddenLine xmlns="" xmlns:a14="http://schemas.microsoft.com/office/drawing/2010/main" w="9525">
                   <a:solidFill>
                     <a:srgbClr val="000000"/>
                   </a:solidFill>
@@ -3313,7 +3313,7 @@
             </a:ln>
             <a:extLst>
               <a:ext uri="{91240B29-F687-4f45-9708-019B960494DF}">
-                <a14:hiddenLine xmlns:a14="http://schemas.microsoft.com/office/drawing/2010/main" xmlns="" w="9525">
+                <a14:hiddenLine xmlns="" xmlns:a14="http://schemas.microsoft.com/office/drawing/2010/main" w="9525">
                   <a:solidFill>
                     <a:srgbClr val="000000"/>
                   </a:solidFill>
@@ -3403,7 +3403,7 @@
             </a:ln>
             <a:extLst>
               <a:ext uri="{91240B29-F687-4f45-9708-019B960494DF}">
-                <a14:hiddenLine xmlns:a14="http://schemas.microsoft.com/office/drawing/2010/main" xmlns="" w="9525">
+                <a14:hiddenLine xmlns="" xmlns:a14="http://schemas.microsoft.com/office/drawing/2010/main" w="9525">
                   <a:solidFill>
                     <a:srgbClr val="000000"/>
                   </a:solidFill>
@@ -3465,7 +3465,7 @@
             </a:ln>
             <a:extLst>
               <a:ext uri="{91240B29-F687-4f45-9708-019B960494DF}">
-                <a14:hiddenLine xmlns:a14="http://schemas.microsoft.com/office/drawing/2010/main" xmlns="" w="9525">
+                <a14:hiddenLine xmlns="" xmlns:a14="http://schemas.microsoft.com/office/drawing/2010/main" w="9525">
                   <a:solidFill>
                     <a:srgbClr val="000000"/>
                   </a:solidFill>
@@ -3555,7 +3555,7 @@
             </a:ln>
             <a:extLst>
               <a:ext uri="{91240B29-F687-4f45-9708-019B960494DF}">
-                <a14:hiddenLine xmlns:a14="http://schemas.microsoft.com/office/drawing/2010/main" xmlns="" w="9525">
+                <a14:hiddenLine xmlns="" xmlns:a14="http://schemas.microsoft.com/office/drawing/2010/main" w="9525">
                   <a:solidFill>
                     <a:srgbClr val="000000"/>
                   </a:solidFill>
@@ -3589,7 +3589,7 @@
             </a:ln>
             <a:extLst>
               <a:ext uri="{91240B29-F687-4f45-9708-019B960494DF}">
-                <a14:hiddenLine xmlns:a14="http://schemas.microsoft.com/office/drawing/2010/main" xmlns="" w="9525">
+                <a14:hiddenLine xmlns="" xmlns:a14="http://schemas.microsoft.com/office/drawing/2010/main" w="9525">
                   <a:solidFill>
                     <a:srgbClr val="000000"/>
                   </a:solidFill>
@@ -3654,7 +3654,7 @@
             </a:ln>
             <a:extLst>
               <a:ext uri="{91240B29-F687-4f45-9708-019B960494DF}">
-                <a14:hiddenLine xmlns:a14="http://schemas.microsoft.com/office/drawing/2010/main" xmlns="" w="9525">
+                <a14:hiddenLine xmlns="" xmlns:a14="http://schemas.microsoft.com/office/drawing/2010/main" w="9525">
                   <a:solidFill>
                     <a:srgbClr val="000000"/>
                   </a:solidFill>
@@ -3744,7 +3744,7 @@
             </a:ln>
             <a:extLst>
               <a:ext uri="{91240B29-F687-4f45-9708-019B960494DF}">
-                <a14:hiddenLine xmlns:a14="http://schemas.microsoft.com/office/drawing/2010/main" xmlns="" w="9525">
+                <a14:hiddenLine xmlns="" xmlns:a14="http://schemas.microsoft.com/office/drawing/2010/main" w="9525">
                   <a:solidFill>
                     <a:srgbClr val="000000"/>
                   </a:solidFill>
@@ -3806,7 +3806,7 @@
             </a:ln>
             <a:extLst>
               <a:ext uri="{91240B29-F687-4f45-9708-019B960494DF}">
-                <a14:hiddenLine xmlns:a14="http://schemas.microsoft.com/office/drawing/2010/main" xmlns="" w="9525">
+                <a14:hiddenLine xmlns="" xmlns:a14="http://schemas.microsoft.com/office/drawing/2010/main" w="9525">
                   <a:solidFill>
                     <a:srgbClr val="000000"/>
                   </a:solidFill>
@@ -3896,7 +3896,7 @@
             </a:ln>
             <a:extLst>
               <a:ext uri="{91240B29-F687-4f45-9708-019B960494DF}">
-                <a14:hiddenLine xmlns:a14="http://schemas.microsoft.com/office/drawing/2010/main" xmlns="" w="9525">
+                <a14:hiddenLine xmlns="" xmlns:a14="http://schemas.microsoft.com/office/drawing/2010/main" w="9525">
                   <a:solidFill>
                     <a:srgbClr val="000000"/>
                   </a:solidFill>
@@ -3986,7 +3986,7 @@
             </a:ln>
             <a:extLst>
               <a:ext uri="{91240B29-F687-4f45-9708-019B960494DF}">
-                <a14:hiddenLine xmlns:a14="http://schemas.microsoft.com/office/drawing/2010/main" xmlns="" w="9525">
+                <a14:hiddenLine xmlns="" xmlns:a14="http://schemas.microsoft.com/office/drawing/2010/main" w="9525">
                   <a:solidFill>
                     <a:srgbClr val="000000"/>
                   </a:solidFill>
@@ -4051,7 +4051,7 @@
             </a:ln>
             <a:extLst>
               <a:ext uri="{91240B29-F687-4f45-9708-019B960494DF}">
-                <a14:hiddenLine xmlns:a14="http://schemas.microsoft.com/office/drawing/2010/main" xmlns="" w="9525">
+                <a14:hiddenLine xmlns="" xmlns:a14="http://schemas.microsoft.com/office/drawing/2010/main" w="9525">
                   <a:solidFill>
                     <a:srgbClr val="000000"/>
                   </a:solidFill>
@@ -4113,7 +4113,7 @@
             </a:ln>
             <a:extLst>
               <a:ext uri="{91240B29-F687-4f45-9708-019B960494DF}">
-                <a14:hiddenLine xmlns:a14="http://schemas.microsoft.com/office/drawing/2010/main" xmlns="" w="9525">
+                <a14:hiddenLine xmlns="" xmlns:a14="http://schemas.microsoft.com/office/drawing/2010/main" w="9525">
                   <a:solidFill>
                     <a:srgbClr val="000000"/>
                   </a:solidFill>
@@ -4203,7 +4203,7 @@
             </a:ln>
             <a:extLst>
               <a:ext uri="{91240B29-F687-4f45-9708-019B960494DF}">
-                <a14:hiddenLine xmlns:a14="http://schemas.microsoft.com/office/drawing/2010/main" xmlns="" w="9525">
+                <a14:hiddenLine xmlns="" xmlns:a14="http://schemas.microsoft.com/office/drawing/2010/main" w="9525">
                   <a:solidFill>
                     <a:srgbClr val="000000"/>
                   </a:solidFill>
@@ -4293,7 +4293,7 @@
             </a:ln>
             <a:extLst>
               <a:ext uri="{91240B29-F687-4f45-9708-019B960494DF}">
-                <a14:hiddenLine xmlns:a14="http://schemas.microsoft.com/office/drawing/2010/main" xmlns="" w="9525">
+                <a14:hiddenLine xmlns="" xmlns:a14="http://schemas.microsoft.com/office/drawing/2010/main" w="9525">
                   <a:solidFill>
                     <a:srgbClr val="000000"/>
                   </a:solidFill>
@@ -4355,7 +4355,7 @@
             </a:ln>
             <a:extLst>
               <a:ext uri="{91240B29-F687-4f45-9708-019B960494DF}">
-                <a14:hiddenLine xmlns:a14="http://schemas.microsoft.com/office/drawing/2010/main" xmlns="" w="9525">
+                <a14:hiddenLine xmlns="" xmlns:a14="http://schemas.microsoft.com/office/drawing/2010/main" w="9525">
                   <a:solidFill>
                     <a:srgbClr val="000000"/>
                   </a:solidFill>
@@ -4475,7 +4475,7 @@
             </a:ln>
             <a:extLst>
               <a:ext uri="{91240B29-F687-4f45-9708-019B960494DF}">
-                <a14:hiddenLine xmlns:a14="http://schemas.microsoft.com/office/drawing/2010/main" xmlns="" w="9525">
+                <a14:hiddenLine xmlns="" xmlns:a14="http://schemas.microsoft.com/office/drawing/2010/main" w="9525">
                   <a:solidFill>
                     <a:srgbClr val="000000"/>
                   </a:solidFill>
@@ -4543,7 +4543,7 @@
             </a:ln>
             <a:extLst>
               <a:ext uri="{91240B29-F687-4f45-9708-019B960494DF}">
-                <a14:hiddenLine xmlns:a14="http://schemas.microsoft.com/office/drawing/2010/main" xmlns="" w="9525">
+                <a14:hiddenLine xmlns="" xmlns:a14="http://schemas.microsoft.com/office/drawing/2010/main" w="9525">
                   <a:solidFill>
                     <a:srgbClr val="000000"/>
                   </a:solidFill>
@@ -4633,7 +4633,7 @@
             </a:ln>
             <a:extLst>
               <a:ext uri="{91240B29-F687-4f45-9708-019B960494DF}">
-                <a14:hiddenLine xmlns:a14="http://schemas.microsoft.com/office/drawing/2010/main" xmlns="" w="9525">
+                <a14:hiddenLine xmlns="" xmlns:a14="http://schemas.microsoft.com/office/drawing/2010/main" w="9525">
                   <a:solidFill>
                     <a:srgbClr val="000000"/>
                   </a:solidFill>
@@ -9431,7 +9431,7 @@
           <a:noFill/>
           <a:extLst>
             <a:ext uri="{909E8E84-426E-40dd-AFC4-6F175D3DCCD1}">
-              <a14:hiddenFill xmlns:a14="http://schemas.microsoft.com/office/drawing/2010/main" xmlns="">
+              <a14:hiddenFill xmlns="" xmlns:a14="http://schemas.microsoft.com/office/drawing/2010/main">
                 <a:solidFill>
                   <a:srgbClr val="FFFFFF"/>
                 </a:solidFill>
@@ -9505,7 +9505,7 @@
               </a:ln>
               <a:extLst>
                 <a:ext uri="{91240B29-F687-4f45-9708-019B960494DF}">
-                  <a14:hiddenLine xmlns:a14="http://schemas.microsoft.com/office/drawing/2010/main" xmlns="" w="9525">
+                  <a14:hiddenLine xmlns="" xmlns:a14="http://schemas.microsoft.com/office/drawing/2010/main" w="9525">
                     <a:solidFill>
                       <a:srgbClr val="000000"/>
                     </a:solidFill>
@@ -9595,7 +9595,7 @@
               </a:ln>
               <a:extLst>
                 <a:ext uri="{91240B29-F687-4f45-9708-019B960494DF}">
-                  <a14:hiddenLine xmlns:a14="http://schemas.microsoft.com/office/drawing/2010/main" xmlns="" w="9525">
+                  <a14:hiddenLine xmlns="" xmlns:a14="http://schemas.microsoft.com/office/drawing/2010/main" w="9525">
                     <a:solidFill>
                       <a:srgbClr val="000000"/>
                     </a:solidFill>
@@ -9685,7 +9685,7 @@
               </a:ln>
               <a:extLst>
                 <a:ext uri="{91240B29-F687-4f45-9708-019B960494DF}">
-                  <a14:hiddenLine xmlns:a14="http://schemas.microsoft.com/office/drawing/2010/main" xmlns="" w="9525">
+                  <a14:hiddenLine xmlns="" xmlns:a14="http://schemas.microsoft.com/office/drawing/2010/main" w="9525">
                     <a:solidFill>
                       <a:srgbClr val="000000"/>
                     </a:solidFill>
@@ -9747,7 +9747,7 @@
               </a:ln>
               <a:extLst>
                 <a:ext uri="{91240B29-F687-4f45-9708-019B960494DF}">
-                  <a14:hiddenLine xmlns:a14="http://schemas.microsoft.com/office/drawing/2010/main" xmlns="" w="9525">
+                  <a14:hiddenLine xmlns="" xmlns:a14="http://schemas.microsoft.com/office/drawing/2010/main" w="9525">
                     <a:solidFill>
                       <a:srgbClr val="000000"/>
                     </a:solidFill>
@@ -9837,7 +9837,7 @@
               </a:ln>
               <a:extLst>
                 <a:ext uri="{91240B29-F687-4f45-9708-019B960494DF}">
-                  <a14:hiddenLine xmlns:a14="http://schemas.microsoft.com/office/drawing/2010/main" xmlns="" w="9525">
+                  <a14:hiddenLine xmlns="" xmlns:a14="http://schemas.microsoft.com/office/drawing/2010/main" w="9525">
                     <a:solidFill>
                       <a:srgbClr val="000000"/>
                     </a:solidFill>
@@ -9899,7 +9899,7 @@
               </a:ln>
               <a:extLst>
                 <a:ext uri="{91240B29-F687-4f45-9708-019B960494DF}">
-                  <a14:hiddenLine xmlns:a14="http://schemas.microsoft.com/office/drawing/2010/main" xmlns="" w="9525">
+                  <a14:hiddenLine xmlns="" xmlns:a14="http://schemas.microsoft.com/office/drawing/2010/main" w="9525">
                     <a:solidFill>
                       <a:srgbClr val="000000"/>
                     </a:solidFill>
@@ -9961,7 +9961,7 @@
               </a:ln>
               <a:extLst>
                 <a:ext uri="{91240B29-F687-4f45-9708-019B960494DF}">
-                  <a14:hiddenLine xmlns:a14="http://schemas.microsoft.com/office/drawing/2010/main" xmlns="" w="9525">
+                  <a14:hiddenLine xmlns="" xmlns:a14="http://schemas.microsoft.com/office/drawing/2010/main" w="9525">
                     <a:solidFill>
                       <a:srgbClr val="000000"/>
                     </a:solidFill>
@@ -10051,7 +10051,7 @@
               </a:ln>
               <a:extLst>
                 <a:ext uri="{91240B29-F687-4f45-9708-019B960494DF}">
-                  <a14:hiddenLine xmlns:a14="http://schemas.microsoft.com/office/drawing/2010/main" xmlns="" w="9525">
+                  <a14:hiddenLine xmlns="" xmlns:a14="http://schemas.microsoft.com/office/drawing/2010/main" w="9525">
                     <a:solidFill>
                       <a:srgbClr val="000000"/>
                     </a:solidFill>
@@ -10141,7 +10141,7 @@
               </a:ln>
               <a:extLst>
                 <a:ext uri="{91240B29-F687-4f45-9708-019B960494DF}">
-                  <a14:hiddenLine xmlns:a14="http://schemas.microsoft.com/office/drawing/2010/main" xmlns="" w="9525">
+                  <a14:hiddenLine xmlns="" xmlns:a14="http://schemas.microsoft.com/office/drawing/2010/main" w="9525">
                     <a:solidFill>
                       <a:srgbClr val="000000"/>
                     </a:solidFill>
@@ -10203,7 +10203,7 @@
               </a:ln>
               <a:extLst>
                 <a:ext uri="{91240B29-F687-4f45-9708-019B960494DF}">
-                  <a14:hiddenLine xmlns:a14="http://schemas.microsoft.com/office/drawing/2010/main" xmlns="" w="9525">
+                  <a14:hiddenLine xmlns="" xmlns:a14="http://schemas.microsoft.com/office/drawing/2010/main" w="9525">
                     <a:solidFill>
                       <a:srgbClr val="000000"/>
                     </a:solidFill>
@@ -10313,7 +10313,7 @@
               </a:ln>
               <a:extLst>
                 <a:ext uri="{91240B29-F687-4f45-9708-019B960494DF}">
-                  <a14:hiddenLine xmlns:a14="http://schemas.microsoft.com/office/drawing/2010/main" xmlns="" w="9525">
+                  <a14:hiddenLine xmlns="" xmlns:a14="http://schemas.microsoft.com/office/drawing/2010/main" w="9525">
                     <a:solidFill>
                       <a:srgbClr val="000000"/>
                     </a:solidFill>
@@ -10397,7 +10397,7 @@
               </a:ln>
               <a:extLst>
                 <a:ext uri="{91240B29-F687-4f45-9708-019B960494DF}">
-                  <a14:hiddenLine xmlns:a14="http://schemas.microsoft.com/office/drawing/2010/main" xmlns="" w="9525">
+                  <a14:hiddenLine xmlns="" xmlns:a14="http://schemas.microsoft.com/office/drawing/2010/main" w="9525">
                     <a:solidFill>
                       <a:srgbClr val="000000"/>
                     </a:solidFill>
@@ -10459,7 +10459,7 @@
               </a:ln>
               <a:extLst>
                 <a:ext uri="{91240B29-F687-4f45-9708-019B960494DF}">
-                  <a14:hiddenLine xmlns:a14="http://schemas.microsoft.com/office/drawing/2010/main" xmlns="" w="9525">
+                  <a14:hiddenLine xmlns="" xmlns:a14="http://schemas.microsoft.com/office/drawing/2010/main" w="9525">
                     <a:solidFill>
                       <a:srgbClr val="000000"/>
                     </a:solidFill>
@@ -10521,7 +10521,7 @@
               </a:ln>
               <a:extLst>
                 <a:ext uri="{91240B29-F687-4f45-9708-019B960494DF}">
-                  <a14:hiddenLine xmlns:a14="http://schemas.microsoft.com/office/drawing/2010/main" xmlns="" w="9525">
+                  <a14:hiddenLine xmlns="" xmlns:a14="http://schemas.microsoft.com/office/drawing/2010/main" w="9525">
                     <a:solidFill>
                       <a:srgbClr val="000000"/>
                     </a:solidFill>
@@ -10611,7 +10611,7 @@
               </a:ln>
               <a:extLst>
                 <a:ext uri="{91240B29-F687-4f45-9708-019B960494DF}">
-                  <a14:hiddenLine xmlns:a14="http://schemas.microsoft.com/office/drawing/2010/main" xmlns="" w="9525">
+                  <a14:hiddenLine xmlns="" xmlns:a14="http://schemas.microsoft.com/office/drawing/2010/main" w="9525">
                     <a:solidFill>
                       <a:srgbClr val="000000"/>
                     </a:solidFill>
@@ -10645,7 +10645,7 @@
               </a:ln>
               <a:extLst>
                 <a:ext uri="{91240B29-F687-4f45-9708-019B960494DF}">
-                  <a14:hiddenLine xmlns:a14="http://schemas.microsoft.com/office/drawing/2010/main" xmlns="" w="9525">
+                  <a14:hiddenLine xmlns="" xmlns:a14="http://schemas.microsoft.com/office/drawing/2010/main" w="9525">
                     <a:solidFill>
                       <a:srgbClr val="000000"/>
                     </a:solidFill>
@@ -10710,7 +10710,7 @@
               </a:ln>
               <a:extLst>
                 <a:ext uri="{91240B29-F687-4f45-9708-019B960494DF}">
-                  <a14:hiddenLine xmlns:a14="http://schemas.microsoft.com/office/drawing/2010/main" xmlns="" w="9525">
+                  <a14:hiddenLine xmlns="" xmlns:a14="http://schemas.microsoft.com/office/drawing/2010/main" w="9525">
                     <a:solidFill>
                       <a:srgbClr val="000000"/>
                     </a:solidFill>
@@ -10800,7 +10800,7 @@
               </a:ln>
               <a:extLst>
                 <a:ext uri="{91240B29-F687-4f45-9708-019B960494DF}">
-                  <a14:hiddenLine xmlns:a14="http://schemas.microsoft.com/office/drawing/2010/main" xmlns="" w="9525">
+                  <a14:hiddenLine xmlns="" xmlns:a14="http://schemas.microsoft.com/office/drawing/2010/main" w="9525">
                     <a:solidFill>
                       <a:srgbClr val="000000"/>
                     </a:solidFill>
@@ -10862,7 +10862,7 @@
               </a:ln>
               <a:extLst>
                 <a:ext uri="{91240B29-F687-4f45-9708-019B960494DF}">
-                  <a14:hiddenLine xmlns:a14="http://schemas.microsoft.com/office/drawing/2010/main" xmlns="" w="9525">
+                  <a14:hiddenLine xmlns="" xmlns:a14="http://schemas.microsoft.com/office/drawing/2010/main" w="9525">
                     <a:solidFill>
                       <a:srgbClr val="000000"/>
                     </a:solidFill>
@@ -10952,7 +10952,7 @@
               </a:ln>
               <a:extLst>
                 <a:ext uri="{91240B29-F687-4f45-9708-019B960494DF}">
-                  <a14:hiddenLine xmlns:a14="http://schemas.microsoft.com/office/drawing/2010/main" xmlns="" w="9525">
+                  <a14:hiddenLine xmlns="" xmlns:a14="http://schemas.microsoft.com/office/drawing/2010/main" w="9525">
                     <a:solidFill>
                       <a:srgbClr val="000000"/>
                     </a:solidFill>
@@ -11017,7 +11017,7 @@
               </a:ln>
               <a:extLst>
                 <a:ext uri="{91240B29-F687-4f45-9708-019B960494DF}">
-                  <a14:hiddenLine xmlns:a14="http://schemas.microsoft.com/office/drawing/2010/main" xmlns="" w="9525">
+                  <a14:hiddenLine xmlns="" xmlns:a14="http://schemas.microsoft.com/office/drawing/2010/main" w="9525">
                     <a:solidFill>
                       <a:srgbClr val="000000"/>
                     </a:solidFill>
@@ -11079,7 +11079,7 @@
               </a:ln>
               <a:extLst>
                 <a:ext uri="{91240B29-F687-4f45-9708-019B960494DF}">
-                  <a14:hiddenLine xmlns:a14="http://schemas.microsoft.com/office/drawing/2010/main" xmlns="" w="9525">
+                  <a14:hiddenLine xmlns="" xmlns:a14="http://schemas.microsoft.com/office/drawing/2010/main" w="9525">
                     <a:solidFill>
                       <a:srgbClr val="000000"/>
                     </a:solidFill>
@@ -11169,7 +11169,7 @@
               </a:ln>
               <a:extLst>
                 <a:ext uri="{91240B29-F687-4f45-9708-019B960494DF}">
-                  <a14:hiddenLine xmlns:a14="http://schemas.microsoft.com/office/drawing/2010/main" xmlns="" w="9525">
+                  <a14:hiddenLine xmlns="" xmlns:a14="http://schemas.microsoft.com/office/drawing/2010/main" w="9525">
                     <a:solidFill>
                       <a:srgbClr val="000000"/>
                     </a:solidFill>
@@ -11259,7 +11259,7 @@
               </a:ln>
               <a:extLst>
                 <a:ext uri="{91240B29-F687-4f45-9708-019B960494DF}">
-                  <a14:hiddenLine xmlns:a14="http://schemas.microsoft.com/office/drawing/2010/main" xmlns="" w="9525">
+                  <a14:hiddenLine xmlns="" xmlns:a14="http://schemas.microsoft.com/office/drawing/2010/main" w="9525">
                     <a:solidFill>
                       <a:srgbClr val="000000"/>
                     </a:solidFill>
@@ -11324,7 +11324,7 @@
               </a:ln>
               <a:extLst>
                 <a:ext uri="{91240B29-F687-4f45-9708-019B960494DF}">
-                  <a14:hiddenLine xmlns:a14="http://schemas.microsoft.com/office/drawing/2010/main" xmlns="" w="9525">
+                  <a14:hiddenLine xmlns="" xmlns:a14="http://schemas.microsoft.com/office/drawing/2010/main" w="9525">
                     <a:solidFill>
                       <a:srgbClr val="000000"/>
                     </a:solidFill>
@@ -11444,7 +11444,7 @@
               </a:ln>
               <a:extLst>
                 <a:ext uri="{91240B29-F687-4f45-9708-019B960494DF}">
-                  <a14:hiddenLine xmlns:a14="http://schemas.microsoft.com/office/drawing/2010/main" xmlns="" w="9525">
+                  <a14:hiddenLine xmlns="" xmlns:a14="http://schemas.microsoft.com/office/drawing/2010/main" w="9525">
                     <a:solidFill>
                       <a:srgbClr val="000000"/>
                     </a:solidFill>
@@ -11542,7 +11542,7 @@
               </a:ln>
               <a:extLst>
                 <a:ext uri="{91240B29-F687-4f45-9708-019B960494DF}">
-                  <a14:hiddenLine xmlns:a14="http://schemas.microsoft.com/office/drawing/2010/main" xmlns="" w="9525">
+                  <a14:hiddenLine xmlns="" xmlns:a14="http://schemas.microsoft.com/office/drawing/2010/main" w="9525">
                     <a:solidFill>
                       <a:srgbClr val="000000"/>
                     </a:solidFill>
@@ -11657,7 +11657,7 @@
               </a:ln>
               <a:extLst>
                 <a:ext uri="{91240B29-F687-4f45-9708-019B960494DF}">
-                  <a14:hiddenLine xmlns:a14="http://schemas.microsoft.com/office/drawing/2010/main" xmlns="" w="9525">
+                  <a14:hiddenLine xmlns="" xmlns:a14="http://schemas.microsoft.com/office/drawing/2010/main" w="9525">
                     <a:solidFill>
                       <a:srgbClr val="000000"/>
                     </a:solidFill>
@@ -11747,7 +11747,7 @@
               </a:ln>
               <a:extLst>
                 <a:ext uri="{91240B29-F687-4f45-9708-019B960494DF}">
-                  <a14:hiddenLine xmlns:a14="http://schemas.microsoft.com/office/drawing/2010/main" xmlns="" w="9525">
+                  <a14:hiddenLine xmlns="" xmlns:a14="http://schemas.microsoft.com/office/drawing/2010/main" w="9525">
                     <a:solidFill>
                       <a:srgbClr val="000000"/>
                     </a:solidFill>
@@ -11812,7 +11812,7 @@
               </a:ln>
               <a:extLst>
                 <a:ext uri="{91240B29-F687-4f45-9708-019B960494DF}">
-                  <a14:hiddenLine xmlns:a14="http://schemas.microsoft.com/office/drawing/2010/main" xmlns="" w="9525">
+                  <a14:hiddenLine xmlns="" xmlns:a14="http://schemas.microsoft.com/office/drawing/2010/main" w="9525">
                     <a:solidFill>
                       <a:srgbClr val="000000"/>
                     </a:solidFill>
@@ -11902,7 +11902,7 @@
               </a:ln>
               <a:extLst>
                 <a:ext uri="{91240B29-F687-4f45-9708-019B960494DF}">
-                  <a14:hiddenLine xmlns:a14="http://schemas.microsoft.com/office/drawing/2010/main" xmlns="" w="9525">
+                  <a14:hiddenLine xmlns="" xmlns:a14="http://schemas.microsoft.com/office/drawing/2010/main" w="9525">
                     <a:solidFill>
                       <a:srgbClr val="000000"/>
                     </a:solidFill>
@@ -11970,7 +11970,7 @@
               </a:ln>
               <a:extLst>
                 <a:ext uri="{91240B29-F687-4f45-9708-019B960494DF}">
-                  <a14:hiddenLine xmlns:a14="http://schemas.microsoft.com/office/drawing/2010/main" xmlns="" w="9525">
+                  <a14:hiddenLine xmlns="" xmlns:a14="http://schemas.microsoft.com/office/drawing/2010/main" w="9525">
                     <a:solidFill>
                       <a:srgbClr val="000000"/>
                     </a:solidFill>
@@ -12060,7 +12060,7 @@
               </a:ln>
               <a:extLst>
                 <a:ext uri="{91240B29-F687-4f45-9708-019B960494DF}">
-                  <a14:hiddenLine xmlns:a14="http://schemas.microsoft.com/office/drawing/2010/main" xmlns="" w="9525">
+                  <a14:hiddenLine xmlns="" xmlns:a14="http://schemas.microsoft.com/office/drawing/2010/main" w="9525">
                     <a:solidFill>
                       <a:srgbClr val="000000"/>
                     </a:solidFill>
@@ -12128,7 +12128,7 @@
               </a:ln>
               <a:extLst>
                 <a:ext uri="{91240B29-F687-4f45-9708-019B960494DF}">
-                  <a14:hiddenLine xmlns:a14="http://schemas.microsoft.com/office/drawing/2010/main" xmlns="" w="9525">
+                  <a14:hiddenLine xmlns="" xmlns:a14="http://schemas.microsoft.com/office/drawing/2010/main" w="9525">
                     <a:solidFill>
                       <a:srgbClr val="000000"/>
                     </a:solidFill>
@@ -12218,7 +12218,7 @@
               </a:ln>
               <a:extLst>
                 <a:ext uri="{91240B29-F687-4f45-9708-019B960494DF}">
-                  <a14:hiddenLine xmlns:a14="http://schemas.microsoft.com/office/drawing/2010/main" xmlns="" w="9525">
+                  <a14:hiddenLine xmlns="" xmlns:a14="http://schemas.microsoft.com/office/drawing/2010/main" w="9525">
                     <a:solidFill>
                       <a:srgbClr val="000000"/>
                     </a:solidFill>
@@ -12252,7 +12252,7 @@
               </a:ln>
               <a:extLst>
                 <a:ext uri="{91240B29-F687-4f45-9708-019B960494DF}">
-                  <a14:hiddenLine xmlns:a14="http://schemas.microsoft.com/office/drawing/2010/main" xmlns="" w="9525">
+                  <a14:hiddenLine xmlns="" xmlns:a14="http://schemas.microsoft.com/office/drawing/2010/main" w="9525">
                     <a:solidFill>
                       <a:srgbClr val="000000"/>
                     </a:solidFill>
@@ -16768,6 +16768,51 @@
           </a:prstGeom>
         </p:spPr>
       </p:pic>
+      <p:sp>
+        <p:nvSpPr>
+          <p:cNvPr id="3" name="TextBox 2">
+            <a:extLst>
+              <a:ext uri="{FF2B5EF4-FFF2-40B4-BE49-F238E27FC236}">
+                <a16:creationId xmlns:a16="http://schemas.microsoft.com/office/drawing/2014/main" id="{B664154F-B4A8-3408-770C-0DE139AD6D62}"/>
+              </a:ext>
+            </a:extLst>
+          </p:cNvPr>
+          <p:cNvSpPr txBox="1"/>
+          <p:nvPr/>
+        </p:nvSpPr>
+        <p:spPr>
+          <a:xfrm>
+            <a:off x="2805344" y="5513942"/>
+            <a:ext cx="5635966" cy="369332"/>
+          </a:xfrm>
+          <a:prstGeom prst="rect">
+            <a:avLst/>
+          </a:prstGeom>
+          <a:noFill/>
+        </p:spPr>
+        <p:txBody>
+          <a:bodyPr wrap="none" rtlCol="0">
+            <a:spAutoFit/>
+          </a:bodyPr>
+          <a:lstStyle/>
+          <a:p>
+            <a:r>
+              <a:rPr lang="en-US" dirty="0"/>
+              <a:t>Source: </a:t>
+            </a:r>
+            <a:r>
+              <a:rPr lang="en-US" dirty="0">
+                <a:hlinkClick r:id="rId3"/>
+              </a:rPr>
+              <a:t>https://www.youtube.com/watch?v=CKAZAh5icPQ</a:t>
+            </a:r>
+            <a:r>
+              <a:rPr lang="en-US" dirty="0"/>
+              <a:t> </a:t>
+            </a:r>
+          </a:p>
+        </p:txBody>
+      </p:sp>
     </p:spTree>
     <p:extLst>
       <p:ext uri="{BB962C8B-B14F-4D97-AF65-F5344CB8AC3E}">

</xml_diff>

<commit_message>
Good faith cyber-risk detection process BSides CT
</commit_message>
<xml_diff>
--- a/2023-0930-BSIDES_CT.pptx
+++ b/2023-0930-BSIDES_CT.pptx
@@ -230,7 +230,7 @@
           <a:p>
             <a:fld id="{9C099003-50DA-4517-9507-116940F6B88D}" type="datetimeFigureOut">
               <a:rPr lang="en-US" smtClean="0"/>
-              <a:t>10/1/2023</a:t>
+              <a:t>10/15/2023</a:t>
             </a:fld>
             <a:endParaRPr lang="en-US" dirty="0"/>
           </a:p>
@@ -547,7 +547,7 @@
           <a:noFill/>
           <a:extLst>
             <a:ext uri="{909E8E84-426E-40dd-AFC4-6F175D3DCCD1}">
-              <a14:hiddenFill xmlns="" xmlns:a14="http://schemas.microsoft.com/office/drawing/2010/main">
+              <a14:hiddenFill xmlns:a14="http://schemas.microsoft.com/office/drawing/2010/main" xmlns="">
                 <a:solidFill>
                   <a:srgbClr val="FFFFFF"/>
                 </a:solidFill>
@@ -607,7 +607,7 @@
             </a:ln>
             <a:extLst>
               <a:ext uri="{91240B29-F687-4f45-9708-019B960494DF}">
-                <a14:hiddenLine xmlns="" xmlns:a14="http://schemas.microsoft.com/office/drawing/2010/main" w="9525">
+                <a14:hiddenLine xmlns:a14="http://schemas.microsoft.com/office/drawing/2010/main" xmlns="" w="9525">
                   <a:solidFill>
                     <a:srgbClr val="000000"/>
                   </a:solidFill>
@@ -697,7 +697,7 @@
             </a:ln>
             <a:extLst>
               <a:ext uri="{91240B29-F687-4f45-9708-019B960494DF}">
-                <a14:hiddenLine xmlns="" xmlns:a14="http://schemas.microsoft.com/office/drawing/2010/main" w="9525">
+                <a14:hiddenLine xmlns:a14="http://schemas.microsoft.com/office/drawing/2010/main" xmlns="" w="9525">
                   <a:solidFill>
                     <a:srgbClr val="000000"/>
                   </a:solidFill>
@@ -787,7 +787,7 @@
             </a:ln>
             <a:extLst>
               <a:ext uri="{91240B29-F687-4f45-9708-019B960494DF}">
-                <a14:hiddenLine xmlns="" xmlns:a14="http://schemas.microsoft.com/office/drawing/2010/main" w="9525">
+                <a14:hiddenLine xmlns:a14="http://schemas.microsoft.com/office/drawing/2010/main" xmlns="" w="9525">
                   <a:solidFill>
                     <a:srgbClr val="000000"/>
                   </a:solidFill>
@@ -821,7 +821,7 @@
             </a:ln>
             <a:extLst>
               <a:ext uri="{91240B29-F687-4f45-9708-019B960494DF}">
-                <a14:hiddenLine xmlns="" xmlns:a14="http://schemas.microsoft.com/office/drawing/2010/main" w="9525">
+                <a14:hiddenLine xmlns:a14="http://schemas.microsoft.com/office/drawing/2010/main" xmlns="" w="9525">
                   <a:solidFill>
                     <a:srgbClr val="000000"/>
                   </a:solidFill>
@@ -911,7 +911,7 @@
             </a:ln>
             <a:extLst>
               <a:ext uri="{91240B29-F687-4f45-9708-019B960494DF}">
-                <a14:hiddenLine xmlns="" xmlns:a14="http://schemas.microsoft.com/office/drawing/2010/main" w="9525">
+                <a14:hiddenLine xmlns:a14="http://schemas.microsoft.com/office/drawing/2010/main" xmlns="" w="9525">
                   <a:solidFill>
                     <a:srgbClr val="000000"/>
                   </a:solidFill>
@@ -973,7 +973,7 @@
             </a:ln>
             <a:extLst>
               <a:ext uri="{91240B29-F687-4f45-9708-019B960494DF}">
-                <a14:hiddenLine xmlns="" xmlns:a14="http://schemas.microsoft.com/office/drawing/2010/main" w="9525">
+                <a14:hiddenLine xmlns:a14="http://schemas.microsoft.com/office/drawing/2010/main" xmlns="" w="9525">
                   <a:solidFill>
                     <a:srgbClr val="000000"/>
                   </a:solidFill>
@@ -1035,7 +1035,7 @@
             </a:ln>
             <a:extLst>
               <a:ext uri="{91240B29-F687-4f45-9708-019B960494DF}">
-                <a14:hiddenLine xmlns="" xmlns:a14="http://schemas.microsoft.com/office/drawing/2010/main" w="9525">
+                <a14:hiddenLine xmlns:a14="http://schemas.microsoft.com/office/drawing/2010/main" xmlns="" w="9525">
                   <a:solidFill>
                     <a:srgbClr val="000000"/>
                   </a:solidFill>
@@ -1125,7 +1125,7 @@
             </a:ln>
             <a:extLst>
               <a:ext uri="{91240B29-F687-4f45-9708-019B960494DF}">
-                <a14:hiddenLine xmlns="" xmlns:a14="http://schemas.microsoft.com/office/drawing/2010/main" w="9525">
+                <a14:hiddenLine xmlns:a14="http://schemas.microsoft.com/office/drawing/2010/main" xmlns="" w="9525">
                   <a:solidFill>
                     <a:srgbClr val="000000"/>
                   </a:solidFill>
@@ -1187,7 +1187,7 @@
             </a:ln>
             <a:extLst>
               <a:ext uri="{91240B29-F687-4f45-9708-019B960494DF}">
-                <a14:hiddenLine xmlns="" xmlns:a14="http://schemas.microsoft.com/office/drawing/2010/main" w="9525">
+                <a14:hiddenLine xmlns:a14="http://schemas.microsoft.com/office/drawing/2010/main" xmlns="" w="9525">
                   <a:solidFill>
                     <a:srgbClr val="000000"/>
                   </a:solidFill>
@@ -1249,7 +1249,7 @@
             </a:ln>
             <a:extLst>
               <a:ext uri="{91240B29-F687-4f45-9708-019B960494DF}">
-                <a14:hiddenLine xmlns="" xmlns:a14="http://schemas.microsoft.com/office/drawing/2010/main" w="9525">
+                <a14:hiddenLine xmlns:a14="http://schemas.microsoft.com/office/drawing/2010/main" xmlns="" w="9525">
                   <a:solidFill>
                     <a:srgbClr val="000000"/>
                   </a:solidFill>
@@ -1339,7 +1339,7 @@
             </a:ln>
             <a:extLst>
               <a:ext uri="{91240B29-F687-4f45-9708-019B960494DF}">
-                <a14:hiddenLine xmlns="" xmlns:a14="http://schemas.microsoft.com/office/drawing/2010/main" w="9525">
+                <a14:hiddenLine xmlns:a14="http://schemas.microsoft.com/office/drawing/2010/main" xmlns="" w="9525">
                   <a:solidFill>
                     <a:srgbClr val="000000"/>
                   </a:solidFill>
@@ -1429,7 +1429,7 @@
             </a:ln>
             <a:extLst>
               <a:ext uri="{91240B29-F687-4f45-9708-019B960494DF}">
-                <a14:hiddenLine xmlns="" xmlns:a14="http://schemas.microsoft.com/office/drawing/2010/main" w="9525">
+                <a14:hiddenLine xmlns:a14="http://schemas.microsoft.com/office/drawing/2010/main" xmlns="" w="9525">
                   <a:solidFill>
                     <a:srgbClr val="000000"/>
                   </a:solidFill>
@@ -1491,7 +1491,7 @@
             </a:ln>
             <a:extLst>
               <a:ext uri="{91240B29-F687-4f45-9708-019B960494DF}">
-                <a14:hiddenLine xmlns="" xmlns:a14="http://schemas.microsoft.com/office/drawing/2010/main" w="9525">
+                <a14:hiddenLine xmlns:a14="http://schemas.microsoft.com/office/drawing/2010/main" xmlns="" w="9525">
                   <a:solidFill>
                     <a:srgbClr val="000000"/>
                   </a:solidFill>
@@ -1601,7 +1601,7 @@
             </a:ln>
             <a:extLst>
               <a:ext uri="{91240B29-F687-4f45-9708-019B960494DF}">
-                <a14:hiddenLine xmlns="" xmlns:a14="http://schemas.microsoft.com/office/drawing/2010/main" w="9525">
+                <a14:hiddenLine xmlns:a14="http://schemas.microsoft.com/office/drawing/2010/main" xmlns="" w="9525">
                   <a:solidFill>
                     <a:srgbClr val="000000"/>
                   </a:solidFill>
@@ -1663,7 +1663,7 @@
             </a:ln>
             <a:extLst>
               <a:ext uri="{91240B29-F687-4f45-9708-019B960494DF}">
-                <a14:hiddenLine xmlns="" xmlns:a14="http://schemas.microsoft.com/office/drawing/2010/main" w="9525">
+                <a14:hiddenLine xmlns:a14="http://schemas.microsoft.com/office/drawing/2010/main" xmlns="" w="9525">
                   <a:solidFill>
                     <a:srgbClr val="000000"/>
                   </a:solidFill>
@@ -1753,7 +1753,7 @@
             </a:ln>
             <a:extLst>
               <a:ext uri="{91240B29-F687-4f45-9708-019B960494DF}">
-                <a14:hiddenLine xmlns="" xmlns:a14="http://schemas.microsoft.com/office/drawing/2010/main" w="9525">
+                <a14:hiddenLine xmlns:a14="http://schemas.microsoft.com/office/drawing/2010/main" xmlns="" w="9525">
                   <a:solidFill>
                     <a:srgbClr val="000000"/>
                   </a:solidFill>
@@ -1843,7 +1843,7 @@
             </a:ln>
             <a:extLst>
               <a:ext uri="{91240B29-F687-4f45-9708-019B960494DF}">
-                <a14:hiddenLine xmlns="" xmlns:a14="http://schemas.microsoft.com/office/drawing/2010/main" w="9525">
+                <a14:hiddenLine xmlns:a14="http://schemas.microsoft.com/office/drawing/2010/main" xmlns="" w="9525">
                   <a:solidFill>
                     <a:srgbClr val="000000"/>
                   </a:solidFill>
@@ -1905,7 +1905,7 @@
             </a:ln>
             <a:extLst>
               <a:ext uri="{91240B29-F687-4f45-9708-019B960494DF}">
-                <a14:hiddenLine xmlns="" xmlns:a14="http://schemas.microsoft.com/office/drawing/2010/main" w="9525">
+                <a14:hiddenLine xmlns:a14="http://schemas.microsoft.com/office/drawing/2010/main" xmlns="" w="9525">
                   <a:solidFill>
                     <a:srgbClr val="000000"/>
                   </a:solidFill>
@@ -1995,7 +1995,7 @@
             </a:ln>
             <a:extLst>
               <a:ext uri="{91240B29-F687-4f45-9708-019B960494DF}">
-                <a14:hiddenLine xmlns="" xmlns:a14="http://schemas.microsoft.com/office/drawing/2010/main" w="9525">
+                <a14:hiddenLine xmlns:a14="http://schemas.microsoft.com/office/drawing/2010/main" xmlns="" w="9525">
                   <a:solidFill>
                     <a:srgbClr val="000000"/>
                   </a:solidFill>
@@ -2085,7 +2085,7 @@
             </a:ln>
             <a:extLst>
               <a:ext uri="{91240B29-F687-4f45-9708-019B960494DF}">
-                <a14:hiddenLine xmlns="" xmlns:a14="http://schemas.microsoft.com/office/drawing/2010/main" w="9525">
+                <a14:hiddenLine xmlns:a14="http://schemas.microsoft.com/office/drawing/2010/main" xmlns="" w="9525">
                   <a:solidFill>
                     <a:srgbClr val="000000"/>
                   </a:solidFill>
@@ -2141,7 +2141,7 @@
             </a:ln>
             <a:extLst>
               <a:ext uri="{91240B29-F687-4f45-9708-019B960494DF}">
-                <a14:hiddenLine xmlns="" xmlns:a14="http://schemas.microsoft.com/office/drawing/2010/main" w="9525">
+                <a14:hiddenLine xmlns:a14="http://schemas.microsoft.com/office/drawing/2010/main" xmlns="" w="9525">
                   <a:solidFill>
                     <a:srgbClr val="000000"/>
                   </a:solidFill>
@@ -2231,7 +2231,7 @@
             </a:ln>
             <a:extLst>
               <a:ext uri="{91240B29-F687-4f45-9708-019B960494DF}">
-                <a14:hiddenLine xmlns="" xmlns:a14="http://schemas.microsoft.com/office/drawing/2010/main" w="9525">
+                <a14:hiddenLine xmlns:a14="http://schemas.microsoft.com/office/drawing/2010/main" xmlns="" w="9525">
                   <a:solidFill>
                     <a:srgbClr val="000000"/>
                   </a:solidFill>
@@ -2287,7 +2287,7 @@
             </a:ln>
             <a:extLst>
               <a:ext uri="{91240B29-F687-4f45-9708-019B960494DF}">
-                <a14:hiddenLine xmlns="" xmlns:a14="http://schemas.microsoft.com/office/drawing/2010/main" w="9525">
+                <a14:hiddenLine xmlns:a14="http://schemas.microsoft.com/office/drawing/2010/main" xmlns="" w="9525">
                   <a:solidFill>
                     <a:srgbClr val="000000"/>
                   </a:solidFill>
@@ -2377,7 +2377,7 @@
             </a:ln>
             <a:extLst>
               <a:ext uri="{91240B29-F687-4f45-9708-019B960494DF}">
-                <a14:hiddenLine xmlns="" xmlns:a14="http://schemas.microsoft.com/office/drawing/2010/main" w="9525">
+                <a14:hiddenLine xmlns:a14="http://schemas.microsoft.com/office/drawing/2010/main" xmlns="" w="9525">
                   <a:solidFill>
                     <a:srgbClr val="000000"/>
                   </a:solidFill>
@@ -2445,7 +2445,7 @@
             </a:ln>
             <a:extLst>
               <a:ext uri="{91240B29-F687-4f45-9708-019B960494DF}">
-                <a14:hiddenLine xmlns="" xmlns:a14="http://schemas.microsoft.com/office/drawing/2010/main" w="9525">
+                <a14:hiddenLine xmlns:a14="http://schemas.microsoft.com/office/drawing/2010/main" xmlns="" w="9525">
                   <a:solidFill>
                     <a:srgbClr val="000000"/>
                   </a:solidFill>
@@ -2535,7 +2535,7 @@
             </a:ln>
             <a:extLst>
               <a:ext uri="{91240B29-F687-4f45-9708-019B960494DF}">
-                <a14:hiddenLine xmlns="" xmlns:a14="http://schemas.microsoft.com/office/drawing/2010/main" w="9525">
+                <a14:hiddenLine xmlns:a14="http://schemas.microsoft.com/office/drawing/2010/main" xmlns="" w="9525">
                   <a:solidFill>
                     <a:srgbClr val="000000"/>
                   </a:solidFill>
@@ -2603,7 +2603,7 @@
             </a:ln>
             <a:extLst>
               <a:ext uri="{91240B29-F687-4f45-9708-019B960494DF}">
-                <a14:hiddenLine xmlns="" xmlns:a14="http://schemas.microsoft.com/office/drawing/2010/main" w="9525">
+                <a14:hiddenLine xmlns:a14="http://schemas.microsoft.com/office/drawing/2010/main" xmlns="" w="9525">
                   <a:solidFill>
                     <a:srgbClr val="000000"/>
                   </a:solidFill>
@@ -2693,7 +2693,7 @@
             </a:ln>
             <a:extLst>
               <a:ext uri="{91240B29-F687-4f45-9708-019B960494DF}">
-                <a14:hiddenLine xmlns="" xmlns:a14="http://schemas.microsoft.com/office/drawing/2010/main" w="9525">
+                <a14:hiddenLine xmlns:a14="http://schemas.microsoft.com/office/drawing/2010/main" xmlns="" w="9525">
                   <a:solidFill>
                     <a:srgbClr val="000000"/>
                   </a:solidFill>
@@ -2727,7 +2727,7 @@
             </a:ln>
             <a:extLst>
               <a:ext uri="{91240B29-F687-4f45-9708-019B960494DF}">
-                <a14:hiddenLine xmlns="" xmlns:a14="http://schemas.microsoft.com/office/drawing/2010/main" w="9525">
+                <a14:hiddenLine xmlns:a14="http://schemas.microsoft.com/office/drawing/2010/main" xmlns="" w="9525">
                   <a:solidFill>
                     <a:srgbClr val="000000"/>
                   </a:solidFill>
@@ -2817,7 +2817,7 @@
             </a:ln>
             <a:extLst>
               <a:ext uri="{91240B29-F687-4f45-9708-019B960494DF}">
-                <a14:hiddenLine xmlns="" xmlns:a14="http://schemas.microsoft.com/office/drawing/2010/main" w="9525">
+                <a14:hiddenLine xmlns:a14="http://schemas.microsoft.com/office/drawing/2010/main" xmlns="" w="9525">
                   <a:solidFill>
                     <a:srgbClr val="000000"/>
                   </a:solidFill>
@@ -2879,7 +2879,7 @@
             </a:ln>
             <a:extLst>
               <a:ext uri="{91240B29-F687-4f45-9708-019B960494DF}">
-                <a14:hiddenLine xmlns="" xmlns:a14="http://schemas.microsoft.com/office/drawing/2010/main" w="9525">
+                <a14:hiddenLine xmlns:a14="http://schemas.microsoft.com/office/drawing/2010/main" xmlns="" w="9525">
                   <a:solidFill>
                     <a:srgbClr val="000000"/>
                   </a:solidFill>
@@ -2941,7 +2941,7 @@
             </a:ln>
             <a:extLst>
               <a:ext uri="{91240B29-F687-4f45-9708-019B960494DF}">
-                <a14:hiddenLine xmlns="" xmlns:a14="http://schemas.microsoft.com/office/drawing/2010/main" w="9525">
+                <a14:hiddenLine xmlns:a14="http://schemas.microsoft.com/office/drawing/2010/main" xmlns="" w="9525">
                   <a:solidFill>
                     <a:srgbClr val="000000"/>
                   </a:solidFill>
@@ -3031,7 +3031,7 @@
             </a:ln>
             <a:extLst>
               <a:ext uri="{91240B29-F687-4f45-9708-019B960494DF}">
-                <a14:hiddenLine xmlns="" xmlns:a14="http://schemas.microsoft.com/office/drawing/2010/main" w="9525">
+                <a14:hiddenLine xmlns:a14="http://schemas.microsoft.com/office/drawing/2010/main" xmlns="" w="9525">
                   <a:solidFill>
                     <a:srgbClr val="000000"/>
                   </a:solidFill>
@@ -3099,7 +3099,7 @@
             </a:ln>
             <a:extLst>
               <a:ext uri="{91240B29-F687-4f45-9708-019B960494DF}">
-                <a14:hiddenLine xmlns="" xmlns:a14="http://schemas.microsoft.com/office/drawing/2010/main" w="9525">
+                <a14:hiddenLine xmlns:a14="http://schemas.microsoft.com/office/drawing/2010/main" xmlns="" w="9525">
                   <a:solidFill>
                     <a:srgbClr val="000000"/>
                   </a:solidFill>
@@ -3161,7 +3161,7 @@
             </a:ln>
             <a:extLst>
               <a:ext uri="{91240B29-F687-4f45-9708-019B960494DF}">
-                <a14:hiddenLine xmlns="" xmlns:a14="http://schemas.microsoft.com/office/drawing/2010/main" w="9525">
+                <a14:hiddenLine xmlns:a14="http://schemas.microsoft.com/office/drawing/2010/main" xmlns="" w="9525">
                   <a:solidFill>
                     <a:srgbClr val="000000"/>
                   </a:solidFill>
@@ -3251,7 +3251,7 @@
             </a:ln>
             <a:extLst>
               <a:ext uri="{91240B29-F687-4f45-9708-019B960494DF}">
-                <a14:hiddenLine xmlns="" xmlns:a14="http://schemas.microsoft.com/office/drawing/2010/main" w="9525">
+                <a14:hiddenLine xmlns:a14="http://schemas.microsoft.com/office/drawing/2010/main" xmlns="" w="9525">
                   <a:solidFill>
                     <a:srgbClr val="000000"/>
                   </a:solidFill>
@@ -3313,7 +3313,7 @@
             </a:ln>
             <a:extLst>
               <a:ext uri="{91240B29-F687-4f45-9708-019B960494DF}">
-                <a14:hiddenLine xmlns="" xmlns:a14="http://schemas.microsoft.com/office/drawing/2010/main" w="9525">
+                <a14:hiddenLine xmlns:a14="http://schemas.microsoft.com/office/drawing/2010/main" xmlns="" w="9525">
                   <a:solidFill>
                     <a:srgbClr val="000000"/>
                   </a:solidFill>
@@ -3403,7 +3403,7 @@
             </a:ln>
             <a:extLst>
               <a:ext uri="{91240B29-F687-4f45-9708-019B960494DF}">
-                <a14:hiddenLine xmlns="" xmlns:a14="http://schemas.microsoft.com/office/drawing/2010/main" w="9525">
+                <a14:hiddenLine xmlns:a14="http://schemas.microsoft.com/office/drawing/2010/main" xmlns="" w="9525">
                   <a:solidFill>
                     <a:srgbClr val="000000"/>
                   </a:solidFill>
@@ -3465,7 +3465,7 @@
             </a:ln>
             <a:extLst>
               <a:ext uri="{91240B29-F687-4f45-9708-019B960494DF}">
-                <a14:hiddenLine xmlns="" xmlns:a14="http://schemas.microsoft.com/office/drawing/2010/main" w="9525">
+                <a14:hiddenLine xmlns:a14="http://schemas.microsoft.com/office/drawing/2010/main" xmlns="" w="9525">
                   <a:solidFill>
                     <a:srgbClr val="000000"/>
                   </a:solidFill>
@@ -3555,7 +3555,7 @@
             </a:ln>
             <a:extLst>
               <a:ext uri="{91240B29-F687-4f45-9708-019B960494DF}">
-                <a14:hiddenLine xmlns="" xmlns:a14="http://schemas.microsoft.com/office/drawing/2010/main" w="9525">
+                <a14:hiddenLine xmlns:a14="http://schemas.microsoft.com/office/drawing/2010/main" xmlns="" w="9525">
                   <a:solidFill>
                     <a:srgbClr val="000000"/>
                   </a:solidFill>
@@ -3589,7 +3589,7 @@
             </a:ln>
             <a:extLst>
               <a:ext uri="{91240B29-F687-4f45-9708-019B960494DF}">
-                <a14:hiddenLine xmlns="" xmlns:a14="http://schemas.microsoft.com/office/drawing/2010/main" w="9525">
+                <a14:hiddenLine xmlns:a14="http://schemas.microsoft.com/office/drawing/2010/main" xmlns="" w="9525">
                   <a:solidFill>
                     <a:srgbClr val="000000"/>
                   </a:solidFill>
@@ -3654,7 +3654,7 @@
             </a:ln>
             <a:extLst>
               <a:ext uri="{91240B29-F687-4f45-9708-019B960494DF}">
-                <a14:hiddenLine xmlns="" xmlns:a14="http://schemas.microsoft.com/office/drawing/2010/main" w="9525">
+                <a14:hiddenLine xmlns:a14="http://schemas.microsoft.com/office/drawing/2010/main" xmlns="" w="9525">
                   <a:solidFill>
                     <a:srgbClr val="000000"/>
                   </a:solidFill>
@@ -3744,7 +3744,7 @@
             </a:ln>
             <a:extLst>
               <a:ext uri="{91240B29-F687-4f45-9708-019B960494DF}">
-                <a14:hiddenLine xmlns="" xmlns:a14="http://schemas.microsoft.com/office/drawing/2010/main" w="9525">
+                <a14:hiddenLine xmlns:a14="http://schemas.microsoft.com/office/drawing/2010/main" xmlns="" w="9525">
                   <a:solidFill>
                     <a:srgbClr val="000000"/>
                   </a:solidFill>
@@ -3806,7 +3806,7 @@
             </a:ln>
             <a:extLst>
               <a:ext uri="{91240B29-F687-4f45-9708-019B960494DF}">
-                <a14:hiddenLine xmlns="" xmlns:a14="http://schemas.microsoft.com/office/drawing/2010/main" w="9525">
+                <a14:hiddenLine xmlns:a14="http://schemas.microsoft.com/office/drawing/2010/main" xmlns="" w="9525">
                   <a:solidFill>
                     <a:srgbClr val="000000"/>
                   </a:solidFill>
@@ -3896,7 +3896,7 @@
             </a:ln>
             <a:extLst>
               <a:ext uri="{91240B29-F687-4f45-9708-019B960494DF}">
-                <a14:hiddenLine xmlns="" xmlns:a14="http://schemas.microsoft.com/office/drawing/2010/main" w="9525">
+                <a14:hiddenLine xmlns:a14="http://schemas.microsoft.com/office/drawing/2010/main" xmlns="" w="9525">
                   <a:solidFill>
                     <a:srgbClr val="000000"/>
                   </a:solidFill>
@@ -3986,7 +3986,7 @@
             </a:ln>
             <a:extLst>
               <a:ext uri="{91240B29-F687-4f45-9708-019B960494DF}">
-                <a14:hiddenLine xmlns="" xmlns:a14="http://schemas.microsoft.com/office/drawing/2010/main" w="9525">
+                <a14:hiddenLine xmlns:a14="http://schemas.microsoft.com/office/drawing/2010/main" xmlns="" w="9525">
                   <a:solidFill>
                     <a:srgbClr val="000000"/>
                   </a:solidFill>
@@ -4051,7 +4051,7 @@
             </a:ln>
             <a:extLst>
               <a:ext uri="{91240B29-F687-4f45-9708-019B960494DF}">
-                <a14:hiddenLine xmlns="" xmlns:a14="http://schemas.microsoft.com/office/drawing/2010/main" w="9525">
+                <a14:hiddenLine xmlns:a14="http://schemas.microsoft.com/office/drawing/2010/main" xmlns="" w="9525">
                   <a:solidFill>
                     <a:srgbClr val="000000"/>
                   </a:solidFill>
@@ -4113,7 +4113,7 @@
             </a:ln>
             <a:extLst>
               <a:ext uri="{91240B29-F687-4f45-9708-019B960494DF}">
-                <a14:hiddenLine xmlns="" xmlns:a14="http://schemas.microsoft.com/office/drawing/2010/main" w="9525">
+                <a14:hiddenLine xmlns:a14="http://schemas.microsoft.com/office/drawing/2010/main" xmlns="" w="9525">
                   <a:solidFill>
                     <a:srgbClr val="000000"/>
                   </a:solidFill>
@@ -4203,7 +4203,7 @@
             </a:ln>
             <a:extLst>
               <a:ext uri="{91240B29-F687-4f45-9708-019B960494DF}">
-                <a14:hiddenLine xmlns="" xmlns:a14="http://schemas.microsoft.com/office/drawing/2010/main" w="9525">
+                <a14:hiddenLine xmlns:a14="http://schemas.microsoft.com/office/drawing/2010/main" xmlns="" w="9525">
                   <a:solidFill>
                     <a:srgbClr val="000000"/>
                   </a:solidFill>
@@ -4293,7 +4293,7 @@
             </a:ln>
             <a:extLst>
               <a:ext uri="{91240B29-F687-4f45-9708-019B960494DF}">
-                <a14:hiddenLine xmlns="" xmlns:a14="http://schemas.microsoft.com/office/drawing/2010/main" w="9525">
+                <a14:hiddenLine xmlns:a14="http://schemas.microsoft.com/office/drawing/2010/main" xmlns="" w="9525">
                   <a:solidFill>
                     <a:srgbClr val="000000"/>
                   </a:solidFill>
@@ -4355,7 +4355,7 @@
             </a:ln>
             <a:extLst>
               <a:ext uri="{91240B29-F687-4f45-9708-019B960494DF}">
-                <a14:hiddenLine xmlns="" xmlns:a14="http://schemas.microsoft.com/office/drawing/2010/main" w="9525">
+                <a14:hiddenLine xmlns:a14="http://schemas.microsoft.com/office/drawing/2010/main" xmlns="" w="9525">
                   <a:solidFill>
                     <a:srgbClr val="000000"/>
                   </a:solidFill>
@@ -4475,7 +4475,7 @@
             </a:ln>
             <a:extLst>
               <a:ext uri="{91240B29-F687-4f45-9708-019B960494DF}">
-                <a14:hiddenLine xmlns="" xmlns:a14="http://schemas.microsoft.com/office/drawing/2010/main" w="9525">
+                <a14:hiddenLine xmlns:a14="http://schemas.microsoft.com/office/drawing/2010/main" xmlns="" w="9525">
                   <a:solidFill>
                     <a:srgbClr val="000000"/>
                   </a:solidFill>
@@ -4543,7 +4543,7 @@
             </a:ln>
             <a:extLst>
               <a:ext uri="{91240B29-F687-4f45-9708-019B960494DF}">
-                <a14:hiddenLine xmlns="" xmlns:a14="http://schemas.microsoft.com/office/drawing/2010/main" w="9525">
+                <a14:hiddenLine xmlns:a14="http://schemas.microsoft.com/office/drawing/2010/main" xmlns="" w="9525">
                   <a:solidFill>
                     <a:srgbClr val="000000"/>
                   </a:solidFill>
@@ -4633,7 +4633,7 @@
             </a:ln>
             <a:extLst>
               <a:ext uri="{91240B29-F687-4f45-9708-019B960494DF}">
-                <a14:hiddenLine xmlns="" xmlns:a14="http://schemas.microsoft.com/office/drawing/2010/main" w="9525">
+                <a14:hiddenLine xmlns:a14="http://schemas.microsoft.com/office/drawing/2010/main" xmlns="" w="9525">
                   <a:solidFill>
                     <a:srgbClr val="000000"/>
                   </a:solidFill>
@@ -4773,7 +4773,7 @@
           <a:p>
             <a:fld id="{56B791C0-0E59-4EFD-BC9B-AB19E867DAD6}" type="datetime1">
               <a:rPr lang="en-US" smtClean="0"/>
-              <a:t>10/1/2023</a:t>
+              <a:t>10/15/2023</a:t>
             </a:fld>
             <a:endParaRPr lang="en-US" dirty="0"/>
           </a:p>
@@ -5067,7 +5067,7 @@
           <a:p>
             <a:fld id="{621EE40A-5488-4906-AD66-F338A7711E46}" type="datetime1">
               <a:rPr lang="en-US" smtClean="0"/>
-              <a:t>10/1/2023</a:t>
+              <a:t>10/15/2023</a:t>
             </a:fld>
             <a:endParaRPr lang="en-US" dirty="0"/>
           </a:p>
@@ -5261,7 +5261,7 @@
           <a:p>
             <a:fld id="{297BCE8B-424A-44F2-9441-027CD557E042}" type="datetime1">
               <a:rPr lang="en-US" smtClean="0"/>
-              <a:t>10/1/2023</a:t>
+              <a:t>10/15/2023</a:t>
             </a:fld>
             <a:endParaRPr lang="en-US" dirty="0"/>
           </a:p>
@@ -5522,7 +5522,7 @@
           <a:p>
             <a:fld id="{F0A0DDE4-9E8C-49C7-8357-863BA22A9FB5}" type="datetime1">
               <a:rPr lang="en-US" smtClean="0"/>
-              <a:t>10/1/2023</a:t>
+              <a:t>10/15/2023</a:t>
             </a:fld>
             <a:endParaRPr lang="en-US" dirty="0"/>
           </a:p>
@@ -5954,7 +5954,7 @@
           <a:p>
             <a:fld id="{37FA7EA8-C9DF-4FE2-927A-E2090471346D}" type="datetime1">
               <a:rPr lang="en-US" smtClean="0"/>
-              <a:t>10/1/2023</a:t>
+              <a:t>10/15/2023</a:t>
             </a:fld>
             <a:endParaRPr lang="en-US" dirty="0"/>
           </a:p>
@@ -6498,7 +6498,7 @@
           <a:p>
             <a:fld id="{779E3BEB-49D8-488C-88A8-F1D0DBBAC068}" type="datetime1">
               <a:rPr lang="en-US" smtClean="0"/>
-              <a:t>10/1/2023</a:t>
+              <a:t>10/15/2023</a:t>
             </a:fld>
             <a:endParaRPr lang="en-US" dirty="0"/>
           </a:p>
@@ -7213,7 +7213,7 @@
           <a:p>
             <a:fld id="{CF2ECE7E-2E22-42A0-BC2D-246ECC07237B}" type="datetime1">
               <a:rPr lang="en-US" smtClean="0"/>
-              <a:t>10/1/2023</a:t>
+              <a:t>10/15/2023</a:t>
             </a:fld>
             <a:endParaRPr lang="en-US" dirty="0"/>
           </a:p>
@@ -7381,7 +7381,7 @@
           <a:p>
             <a:fld id="{C69C4AE5-5060-4374-B6E1-6B73D531E3EE}" type="datetime1">
               <a:rPr lang="en-US" smtClean="0"/>
-              <a:t>10/1/2023</a:t>
+              <a:t>10/15/2023</a:t>
             </a:fld>
             <a:endParaRPr lang="en-US" dirty="0"/>
           </a:p>
@@ -7559,7 +7559,7 @@
           <a:p>
             <a:fld id="{11998D02-0DEF-4198-A751-D267DB41BF0B}" type="datetime1">
               <a:rPr lang="en-US" smtClean="0"/>
-              <a:t>10/1/2023</a:t>
+              <a:t>10/15/2023</a:t>
             </a:fld>
             <a:endParaRPr lang="en-US" dirty="0"/>
           </a:p>
@@ -7727,7 +7727,7 @@
           <a:p>
             <a:fld id="{8F422B43-45D4-4608-9F03-122930498C43}" type="datetime1">
               <a:rPr lang="en-US" smtClean="0"/>
-              <a:t>10/1/2023</a:t>
+              <a:t>10/15/2023</a:t>
             </a:fld>
             <a:endParaRPr lang="en-US" dirty="0"/>
           </a:p>
@@ -7975,7 +7975,7 @@
           <a:p>
             <a:fld id="{8AF39007-0C4C-4662-9209-D5880C6C6463}" type="datetime1">
               <a:rPr lang="en-US" smtClean="0"/>
-              <a:t>10/1/2023</a:t>
+              <a:t>10/15/2023</a:t>
             </a:fld>
             <a:endParaRPr lang="en-US" dirty="0"/>
           </a:p>
@@ -8205,7 +8205,7 @@
           <a:p>
             <a:fld id="{8D6A9271-10E2-4B68-AE13-FF3919F43119}" type="datetime1">
               <a:rPr lang="en-US" smtClean="0"/>
-              <a:t>10/1/2023</a:t>
+              <a:t>10/15/2023</a:t>
             </a:fld>
             <a:endParaRPr lang="en-US" dirty="0"/>
           </a:p>
@@ -8584,7 +8584,7 @@
           <a:p>
             <a:fld id="{28F7A4B4-2D35-416A-973E-59EAAAA65DE7}" type="datetime1">
               <a:rPr lang="en-US" smtClean="0"/>
-              <a:t>10/1/2023</a:t>
+              <a:t>10/15/2023</a:t>
             </a:fld>
             <a:endParaRPr lang="en-US" dirty="0"/>
           </a:p>
@@ -8700,7 +8700,7 @@
           <a:p>
             <a:fld id="{820E87AD-A1CE-4B6A-A1E1-243C473B1B4F}" type="datetime1">
               <a:rPr lang="en-US" smtClean="0"/>
-              <a:t>10/1/2023</a:t>
+              <a:t>10/15/2023</a:t>
             </a:fld>
             <a:endParaRPr lang="en-US" dirty="0"/>
           </a:p>
@@ -8793,7 +8793,7 @@
           <a:p>
             <a:fld id="{054BD633-0EB0-465D-B200-78F1E8C4393C}" type="datetime1">
               <a:rPr lang="en-US" smtClean="0"/>
-              <a:t>10/1/2023</a:t>
+              <a:t>10/15/2023</a:t>
             </a:fld>
             <a:endParaRPr lang="en-US" dirty="0"/>
           </a:p>
@@ -9040,7 +9040,7 @@
           <a:p>
             <a:fld id="{2DF2695D-A47E-4BE9-B68F-60A28D6B816A}" type="datetime1">
               <a:rPr lang="en-US" smtClean="0"/>
-              <a:t>10/1/2023</a:t>
+              <a:t>10/15/2023</a:t>
             </a:fld>
             <a:endParaRPr lang="en-US" dirty="0"/>
           </a:p>
@@ -9317,7 +9317,7 @@
           <a:p>
             <a:fld id="{36484291-085B-4DF5-86BA-38F041301A2A}" type="datetime1">
               <a:rPr lang="en-US" smtClean="0"/>
-              <a:t>10/1/2023</a:t>
+              <a:t>10/15/2023</a:t>
             </a:fld>
             <a:endParaRPr lang="en-US" dirty="0"/>
           </a:p>
@@ -9431,7 +9431,7 @@
           <a:noFill/>
           <a:extLst>
             <a:ext uri="{909E8E84-426E-40dd-AFC4-6F175D3DCCD1}">
-              <a14:hiddenFill xmlns="" xmlns:a14="http://schemas.microsoft.com/office/drawing/2010/main">
+              <a14:hiddenFill xmlns:a14="http://schemas.microsoft.com/office/drawing/2010/main" xmlns="">
                 <a:solidFill>
                   <a:srgbClr val="FFFFFF"/>
                 </a:solidFill>
@@ -9505,7 +9505,7 @@
               </a:ln>
               <a:extLst>
                 <a:ext uri="{91240B29-F687-4f45-9708-019B960494DF}">
-                  <a14:hiddenLine xmlns="" xmlns:a14="http://schemas.microsoft.com/office/drawing/2010/main" w="9525">
+                  <a14:hiddenLine xmlns:a14="http://schemas.microsoft.com/office/drawing/2010/main" xmlns="" w="9525">
                     <a:solidFill>
                       <a:srgbClr val="000000"/>
                     </a:solidFill>
@@ -9595,7 +9595,7 @@
               </a:ln>
               <a:extLst>
                 <a:ext uri="{91240B29-F687-4f45-9708-019B960494DF}">
-                  <a14:hiddenLine xmlns="" xmlns:a14="http://schemas.microsoft.com/office/drawing/2010/main" w="9525">
+                  <a14:hiddenLine xmlns:a14="http://schemas.microsoft.com/office/drawing/2010/main" xmlns="" w="9525">
                     <a:solidFill>
                       <a:srgbClr val="000000"/>
                     </a:solidFill>
@@ -9685,7 +9685,7 @@
               </a:ln>
               <a:extLst>
                 <a:ext uri="{91240B29-F687-4f45-9708-019B960494DF}">
-                  <a14:hiddenLine xmlns="" xmlns:a14="http://schemas.microsoft.com/office/drawing/2010/main" w="9525">
+                  <a14:hiddenLine xmlns:a14="http://schemas.microsoft.com/office/drawing/2010/main" xmlns="" w="9525">
                     <a:solidFill>
                       <a:srgbClr val="000000"/>
                     </a:solidFill>
@@ -9747,7 +9747,7 @@
               </a:ln>
               <a:extLst>
                 <a:ext uri="{91240B29-F687-4f45-9708-019B960494DF}">
-                  <a14:hiddenLine xmlns="" xmlns:a14="http://schemas.microsoft.com/office/drawing/2010/main" w="9525">
+                  <a14:hiddenLine xmlns:a14="http://schemas.microsoft.com/office/drawing/2010/main" xmlns="" w="9525">
                     <a:solidFill>
                       <a:srgbClr val="000000"/>
                     </a:solidFill>
@@ -9837,7 +9837,7 @@
               </a:ln>
               <a:extLst>
                 <a:ext uri="{91240B29-F687-4f45-9708-019B960494DF}">
-                  <a14:hiddenLine xmlns="" xmlns:a14="http://schemas.microsoft.com/office/drawing/2010/main" w="9525">
+                  <a14:hiddenLine xmlns:a14="http://schemas.microsoft.com/office/drawing/2010/main" xmlns="" w="9525">
                     <a:solidFill>
                       <a:srgbClr val="000000"/>
                     </a:solidFill>
@@ -9899,7 +9899,7 @@
               </a:ln>
               <a:extLst>
                 <a:ext uri="{91240B29-F687-4f45-9708-019B960494DF}">
-                  <a14:hiddenLine xmlns="" xmlns:a14="http://schemas.microsoft.com/office/drawing/2010/main" w="9525">
+                  <a14:hiddenLine xmlns:a14="http://schemas.microsoft.com/office/drawing/2010/main" xmlns="" w="9525">
                     <a:solidFill>
                       <a:srgbClr val="000000"/>
                     </a:solidFill>
@@ -9961,7 +9961,7 @@
               </a:ln>
               <a:extLst>
                 <a:ext uri="{91240B29-F687-4f45-9708-019B960494DF}">
-                  <a14:hiddenLine xmlns="" xmlns:a14="http://schemas.microsoft.com/office/drawing/2010/main" w="9525">
+                  <a14:hiddenLine xmlns:a14="http://schemas.microsoft.com/office/drawing/2010/main" xmlns="" w="9525">
                     <a:solidFill>
                       <a:srgbClr val="000000"/>
                     </a:solidFill>
@@ -10051,7 +10051,7 @@
               </a:ln>
               <a:extLst>
                 <a:ext uri="{91240B29-F687-4f45-9708-019B960494DF}">
-                  <a14:hiddenLine xmlns="" xmlns:a14="http://schemas.microsoft.com/office/drawing/2010/main" w="9525">
+                  <a14:hiddenLine xmlns:a14="http://schemas.microsoft.com/office/drawing/2010/main" xmlns="" w="9525">
                     <a:solidFill>
                       <a:srgbClr val="000000"/>
                     </a:solidFill>
@@ -10141,7 +10141,7 @@
               </a:ln>
               <a:extLst>
                 <a:ext uri="{91240B29-F687-4f45-9708-019B960494DF}">
-                  <a14:hiddenLine xmlns="" xmlns:a14="http://schemas.microsoft.com/office/drawing/2010/main" w="9525">
+                  <a14:hiddenLine xmlns:a14="http://schemas.microsoft.com/office/drawing/2010/main" xmlns="" w="9525">
                     <a:solidFill>
                       <a:srgbClr val="000000"/>
                     </a:solidFill>
@@ -10203,7 +10203,7 @@
               </a:ln>
               <a:extLst>
                 <a:ext uri="{91240B29-F687-4f45-9708-019B960494DF}">
-                  <a14:hiddenLine xmlns="" xmlns:a14="http://schemas.microsoft.com/office/drawing/2010/main" w="9525">
+                  <a14:hiddenLine xmlns:a14="http://schemas.microsoft.com/office/drawing/2010/main" xmlns="" w="9525">
                     <a:solidFill>
                       <a:srgbClr val="000000"/>
                     </a:solidFill>
@@ -10313,7 +10313,7 @@
               </a:ln>
               <a:extLst>
                 <a:ext uri="{91240B29-F687-4f45-9708-019B960494DF}">
-                  <a14:hiddenLine xmlns="" xmlns:a14="http://schemas.microsoft.com/office/drawing/2010/main" w="9525">
+                  <a14:hiddenLine xmlns:a14="http://schemas.microsoft.com/office/drawing/2010/main" xmlns="" w="9525">
                     <a:solidFill>
                       <a:srgbClr val="000000"/>
                     </a:solidFill>
@@ -10397,7 +10397,7 @@
               </a:ln>
               <a:extLst>
                 <a:ext uri="{91240B29-F687-4f45-9708-019B960494DF}">
-                  <a14:hiddenLine xmlns="" xmlns:a14="http://schemas.microsoft.com/office/drawing/2010/main" w="9525">
+                  <a14:hiddenLine xmlns:a14="http://schemas.microsoft.com/office/drawing/2010/main" xmlns="" w="9525">
                     <a:solidFill>
                       <a:srgbClr val="000000"/>
                     </a:solidFill>
@@ -10459,7 +10459,7 @@
               </a:ln>
               <a:extLst>
                 <a:ext uri="{91240B29-F687-4f45-9708-019B960494DF}">
-                  <a14:hiddenLine xmlns="" xmlns:a14="http://schemas.microsoft.com/office/drawing/2010/main" w="9525">
+                  <a14:hiddenLine xmlns:a14="http://schemas.microsoft.com/office/drawing/2010/main" xmlns="" w="9525">
                     <a:solidFill>
                       <a:srgbClr val="000000"/>
                     </a:solidFill>
@@ -10521,7 +10521,7 @@
               </a:ln>
               <a:extLst>
                 <a:ext uri="{91240B29-F687-4f45-9708-019B960494DF}">
-                  <a14:hiddenLine xmlns="" xmlns:a14="http://schemas.microsoft.com/office/drawing/2010/main" w="9525">
+                  <a14:hiddenLine xmlns:a14="http://schemas.microsoft.com/office/drawing/2010/main" xmlns="" w="9525">
                     <a:solidFill>
                       <a:srgbClr val="000000"/>
                     </a:solidFill>
@@ -10611,7 +10611,7 @@
               </a:ln>
               <a:extLst>
                 <a:ext uri="{91240B29-F687-4f45-9708-019B960494DF}">
-                  <a14:hiddenLine xmlns="" xmlns:a14="http://schemas.microsoft.com/office/drawing/2010/main" w="9525">
+                  <a14:hiddenLine xmlns:a14="http://schemas.microsoft.com/office/drawing/2010/main" xmlns="" w="9525">
                     <a:solidFill>
                       <a:srgbClr val="000000"/>
                     </a:solidFill>
@@ -10645,7 +10645,7 @@
               </a:ln>
               <a:extLst>
                 <a:ext uri="{91240B29-F687-4f45-9708-019B960494DF}">
-                  <a14:hiddenLine xmlns="" xmlns:a14="http://schemas.microsoft.com/office/drawing/2010/main" w="9525">
+                  <a14:hiddenLine xmlns:a14="http://schemas.microsoft.com/office/drawing/2010/main" xmlns="" w="9525">
                     <a:solidFill>
                       <a:srgbClr val="000000"/>
                     </a:solidFill>
@@ -10710,7 +10710,7 @@
               </a:ln>
               <a:extLst>
                 <a:ext uri="{91240B29-F687-4f45-9708-019B960494DF}">
-                  <a14:hiddenLine xmlns="" xmlns:a14="http://schemas.microsoft.com/office/drawing/2010/main" w="9525">
+                  <a14:hiddenLine xmlns:a14="http://schemas.microsoft.com/office/drawing/2010/main" xmlns="" w="9525">
                     <a:solidFill>
                       <a:srgbClr val="000000"/>
                     </a:solidFill>
@@ -10800,7 +10800,7 @@
               </a:ln>
               <a:extLst>
                 <a:ext uri="{91240B29-F687-4f45-9708-019B960494DF}">
-                  <a14:hiddenLine xmlns="" xmlns:a14="http://schemas.microsoft.com/office/drawing/2010/main" w="9525">
+                  <a14:hiddenLine xmlns:a14="http://schemas.microsoft.com/office/drawing/2010/main" xmlns="" w="9525">
                     <a:solidFill>
                       <a:srgbClr val="000000"/>
                     </a:solidFill>
@@ -10862,7 +10862,7 @@
               </a:ln>
               <a:extLst>
                 <a:ext uri="{91240B29-F687-4f45-9708-019B960494DF}">
-                  <a14:hiddenLine xmlns="" xmlns:a14="http://schemas.microsoft.com/office/drawing/2010/main" w="9525">
+                  <a14:hiddenLine xmlns:a14="http://schemas.microsoft.com/office/drawing/2010/main" xmlns="" w="9525">
                     <a:solidFill>
                       <a:srgbClr val="000000"/>
                     </a:solidFill>
@@ -10952,7 +10952,7 @@
               </a:ln>
               <a:extLst>
                 <a:ext uri="{91240B29-F687-4f45-9708-019B960494DF}">
-                  <a14:hiddenLine xmlns="" xmlns:a14="http://schemas.microsoft.com/office/drawing/2010/main" w="9525">
+                  <a14:hiddenLine xmlns:a14="http://schemas.microsoft.com/office/drawing/2010/main" xmlns="" w="9525">
                     <a:solidFill>
                       <a:srgbClr val="000000"/>
                     </a:solidFill>
@@ -11017,7 +11017,7 @@
               </a:ln>
               <a:extLst>
                 <a:ext uri="{91240B29-F687-4f45-9708-019B960494DF}">
-                  <a14:hiddenLine xmlns="" xmlns:a14="http://schemas.microsoft.com/office/drawing/2010/main" w="9525">
+                  <a14:hiddenLine xmlns:a14="http://schemas.microsoft.com/office/drawing/2010/main" xmlns="" w="9525">
                     <a:solidFill>
                       <a:srgbClr val="000000"/>
                     </a:solidFill>
@@ -11079,7 +11079,7 @@
               </a:ln>
               <a:extLst>
                 <a:ext uri="{91240B29-F687-4f45-9708-019B960494DF}">
-                  <a14:hiddenLine xmlns="" xmlns:a14="http://schemas.microsoft.com/office/drawing/2010/main" w="9525">
+                  <a14:hiddenLine xmlns:a14="http://schemas.microsoft.com/office/drawing/2010/main" xmlns="" w="9525">
                     <a:solidFill>
                       <a:srgbClr val="000000"/>
                     </a:solidFill>
@@ -11169,7 +11169,7 @@
               </a:ln>
               <a:extLst>
                 <a:ext uri="{91240B29-F687-4f45-9708-019B960494DF}">
-                  <a14:hiddenLine xmlns="" xmlns:a14="http://schemas.microsoft.com/office/drawing/2010/main" w="9525">
+                  <a14:hiddenLine xmlns:a14="http://schemas.microsoft.com/office/drawing/2010/main" xmlns="" w="9525">
                     <a:solidFill>
                       <a:srgbClr val="000000"/>
                     </a:solidFill>
@@ -11259,7 +11259,7 @@
               </a:ln>
               <a:extLst>
                 <a:ext uri="{91240B29-F687-4f45-9708-019B960494DF}">
-                  <a14:hiddenLine xmlns="" xmlns:a14="http://schemas.microsoft.com/office/drawing/2010/main" w="9525">
+                  <a14:hiddenLine xmlns:a14="http://schemas.microsoft.com/office/drawing/2010/main" xmlns="" w="9525">
                     <a:solidFill>
                       <a:srgbClr val="000000"/>
                     </a:solidFill>
@@ -11324,7 +11324,7 @@
               </a:ln>
               <a:extLst>
                 <a:ext uri="{91240B29-F687-4f45-9708-019B960494DF}">
-                  <a14:hiddenLine xmlns="" xmlns:a14="http://schemas.microsoft.com/office/drawing/2010/main" w="9525">
+                  <a14:hiddenLine xmlns:a14="http://schemas.microsoft.com/office/drawing/2010/main" xmlns="" w="9525">
                     <a:solidFill>
                       <a:srgbClr val="000000"/>
                     </a:solidFill>
@@ -11444,7 +11444,7 @@
               </a:ln>
               <a:extLst>
                 <a:ext uri="{91240B29-F687-4f45-9708-019B960494DF}">
-                  <a14:hiddenLine xmlns="" xmlns:a14="http://schemas.microsoft.com/office/drawing/2010/main" w="9525">
+                  <a14:hiddenLine xmlns:a14="http://schemas.microsoft.com/office/drawing/2010/main" xmlns="" w="9525">
                     <a:solidFill>
                       <a:srgbClr val="000000"/>
                     </a:solidFill>
@@ -11542,7 +11542,7 @@
               </a:ln>
               <a:extLst>
                 <a:ext uri="{91240B29-F687-4f45-9708-019B960494DF}">
-                  <a14:hiddenLine xmlns="" xmlns:a14="http://schemas.microsoft.com/office/drawing/2010/main" w="9525">
+                  <a14:hiddenLine xmlns:a14="http://schemas.microsoft.com/office/drawing/2010/main" xmlns="" w="9525">
                     <a:solidFill>
                       <a:srgbClr val="000000"/>
                     </a:solidFill>
@@ -11657,7 +11657,7 @@
               </a:ln>
               <a:extLst>
                 <a:ext uri="{91240B29-F687-4f45-9708-019B960494DF}">
-                  <a14:hiddenLine xmlns="" xmlns:a14="http://schemas.microsoft.com/office/drawing/2010/main" w="9525">
+                  <a14:hiddenLine xmlns:a14="http://schemas.microsoft.com/office/drawing/2010/main" xmlns="" w="9525">
                     <a:solidFill>
                       <a:srgbClr val="000000"/>
                     </a:solidFill>
@@ -11747,7 +11747,7 @@
               </a:ln>
               <a:extLst>
                 <a:ext uri="{91240B29-F687-4f45-9708-019B960494DF}">
-                  <a14:hiddenLine xmlns="" xmlns:a14="http://schemas.microsoft.com/office/drawing/2010/main" w="9525">
+                  <a14:hiddenLine xmlns:a14="http://schemas.microsoft.com/office/drawing/2010/main" xmlns="" w="9525">
                     <a:solidFill>
                       <a:srgbClr val="000000"/>
                     </a:solidFill>
@@ -11812,7 +11812,7 @@
               </a:ln>
               <a:extLst>
                 <a:ext uri="{91240B29-F687-4f45-9708-019B960494DF}">
-                  <a14:hiddenLine xmlns="" xmlns:a14="http://schemas.microsoft.com/office/drawing/2010/main" w="9525">
+                  <a14:hiddenLine xmlns:a14="http://schemas.microsoft.com/office/drawing/2010/main" xmlns="" w="9525">
                     <a:solidFill>
                       <a:srgbClr val="000000"/>
                     </a:solidFill>
@@ -11902,7 +11902,7 @@
               </a:ln>
               <a:extLst>
                 <a:ext uri="{91240B29-F687-4f45-9708-019B960494DF}">
-                  <a14:hiddenLine xmlns="" xmlns:a14="http://schemas.microsoft.com/office/drawing/2010/main" w="9525">
+                  <a14:hiddenLine xmlns:a14="http://schemas.microsoft.com/office/drawing/2010/main" xmlns="" w="9525">
                     <a:solidFill>
                       <a:srgbClr val="000000"/>
                     </a:solidFill>
@@ -11970,7 +11970,7 @@
               </a:ln>
               <a:extLst>
                 <a:ext uri="{91240B29-F687-4f45-9708-019B960494DF}">
-                  <a14:hiddenLine xmlns="" xmlns:a14="http://schemas.microsoft.com/office/drawing/2010/main" w="9525">
+                  <a14:hiddenLine xmlns:a14="http://schemas.microsoft.com/office/drawing/2010/main" xmlns="" w="9525">
                     <a:solidFill>
                       <a:srgbClr val="000000"/>
                     </a:solidFill>
@@ -12060,7 +12060,7 @@
               </a:ln>
               <a:extLst>
                 <a:ext uri="{91240B29-F687-4f45-9708-019B960494DF}">
-                  <a14:hiddenLine xmlns="" xmlns:a14="http://schemas.microsoft.com/office/drawing/2010/main" w="9525">
+                  <a14:hiddenLine xmlns:a14="http://schemas.microsoft.com/office/drawing/2010/main" xmlns="" w="9525">
                     <a:solidFill>
                       <a:srgbClr val="000000"/>
                     </a:solidFill>
@@ -12128,7 +12128,7 @@
               </a:ln>
               <a:extLst>
                 <a:ext uri="{91240B29-F687-4f45-9708-019B960494DF}">
-                  <a14:hiddenLine xmlns="" xmlns:a14="http://schemas.microsoft.com/office/drawing/2010/main" w="9525">
+                  <a14:hiddenLine xmlns:a14="http://schemas.microsoft.com/office/drawing/2010/main" xmlns="" w="9525">
                     <a:solidFill>
                       <a:srgbClr val="000000"/>
                     </a:solidFill>
@@ -12218,7 +12218,7 @@
               </a:ln>
               <a:extLst>
                 <a:ext uri="{91240B29-F687-4f45-9708-019B960494DF}">
-                  <a14:hiddenLine xmlns="" xmlns:a14="http://schemas.microsoft.com/office/drawing/2010/main" w="9525">
+                  <a14:hiddenLine xmlns:a14="http://schemas.microsoft.com/office/drawing/2010/main" xmlns="" w="9525">
                     <a:solidFill>
                       <a:srgbClr val="000000"/>
                     </a:solidFill>
@@ -12252,7 +12252,7 @@
               </a:ln>
               <a:extLst>
                 <a:ext uri="{91240B29-F687-4f45-9708-019B960494DF}">
-                  <a14:hiddenLine xmlns="" xmlns:a14="http://schemas.microsoft.com/office/drawing/2010/main" w="9525">
+                  <a14:hiddenLine xmlns:a14="http://schemas.microsoft.com/office/drawing/2010/main" xmlns="" w="9525">
                     <a:solidFill>
                       <a:srgbClr val="000000"/>
                     </a:solidFill>
@@ -12392,7 +12392,7 @@
           <a:p>
             <a:fld id="{9C9DCB86-526B-42BA-A6FC-BC125ADF4A2D}" type="datetime1">
               <a:rPr lang="en-US" smtClean="0"/>
-              <a:t>10/1/2023</a:t>
+              <a:t>10/15/2023</a:t>
             </a:fld>
             <a:endParaRPr lang="en-US" dirty="0"/>
           </a:p>
@@ -12911,7 +12911,7 @@
           <a:p>
             <a:fld id="{1342AFA8-D0B4-4B6F-ACD9-56B1414E4501}" type="datetime1">
               <a:rPr lang="en-US" smtClean="0"/>
-              <a:t>10/1/2023</a:t>
+              <a:t>10/15/2023</a:t>
             </a:fld>
             <a:endParaRPr lang="en-US" dirty="0"/>
           </a:p>
@@ -13032,7 +13032,7 @@
           <a:p>
             <a:fld id="{8F422B43-45D4-4608-9F03-122930498C43}" type="datetime1">
               <a:rPr lang="en-US" smtClean="0"/>
-              <a:t>10/1/2023</a:t>
+              <a:t>10/15/2023</a:t>
             </a:fld>
             <a:endParaRPr lang="en-US" dirty="0"/>
           </a:p>
@@ -13279,9 +13279,15 @@
                 <a:solidFill>
                   <a:schemeClr val="bg1"/>
                 </a:solidFill>
+                <a:hlinkClick r:id="rId2"/>
               </a:rPr>
               <a:t>Software Supply Chain is also broad</a:t>
             </a:r>
+            <a:endParaRPr lang="en-US" dirty="0">
+              <a:solidFill>
+                <a:schemeClr val="bg1"/>
+              </a:solidFill>
+            </a:endParaRPr>
           </a:p>
           <a:p>
             <a:pPr lvl="1"/>
@@ -13342,7 +13348,7 @@
                 <a:solidFill>
                   <a:schemeClr val="bg1"/>
                 </a:solidFill>
-                <a:hlinkClick r:id="rId2"/>
+                <a:hlinkClick r:id="rId3"/>
               </a:rPr>
               <a:t>ISO/IEC 29147:2018 </a:t>
             </a:r>
@@ -13359,7 +13365,7 @@
                 <a:solidFill>
                   <a:schemeClr val="bg1"/>
                 </a:solidFill>
-                <a:hlinkClick r:id="rId3"/>
+                <a:hlinkClick r:id="rId4"/>
               </a:rPr>
               <a:t>NIST Guidance</a:t>
             </a:r>
@@ -13394,7 +13400,7 @@
           <a:p>
             <a:fld id="{8F422B43-45D4-4608-9F03-122930498C43}" type="datetime1">
               <a:rPr lang="en-US" smtClean="0"/>
-              <a:t>10/1/2023</a:t>
+              <a:t>10/15/2023</a:t>
             </a:fld>
             <a:endParaRPr lang="en-US" dirty="0"/>
           </a:p>
@@ -13511,7 +13517,7 @@
           <a:p>
             <a:fld id="{8F422B43-45D4-4608-9F03-122930498C43}" type="datetime1">
               <a:rPr lang="en-US" smtClean="0"/>
-              <a:t>10/1/2023</a:t>
+              <a:t>10/15/2023</a:t>
             </a:fld>
             <a:endParaRPr lang="en-US" dirty="0"/>
           </a:p>
@@ -13740,7 +13746,7 @@
           <a:p>
             <a:fld id="{8F422B43-45D4-4608-9F03-122930498C43}" type="datetime1">
               <a:rPr lang="en-US" smtClean="0"/>
-              <a:t>10/1/2023</a:t>
+              <a:t>10/15/2023</a:t>
             </a:fld>
             <a:endParaRPr lang="en-US" dirty="0"/>
           </a:p>
@@ -13897,8 +13903,17 @@
                 <a:solidFill>
                   <a:schemeClr val="bg1"/>
                 </a:solidFill>
+                <a:hlinkClick r:id="rId2"/>
               </a:rPr>
-              <a:t>Software Supply Chain Risk Detection Process Following NIST Guidance and SEC Regulations</a:t>
+              <a:t>Software Supply Chain Risk Detection Process</a:t>
+            </a:r>
+            <a:r>
+              <a:rPr lang="en-US" dirty="0">
+                <a:solidFill>
+                  <a:schemeClr val="bg1"/>
+                </a:solidFill>
+              </a:rPr>
+              <a:t> Following NIST Guidance and SEC Regulations</a:t>
             </a:r>
           </a:p>
         </p:txBody>
@@ -13926,7 +13941,7 @@
           <a:p>
             <a:fld id="{8F422B43-45D4-4608-9F03-122930498C43}" type="datetime1">
               <a:rPr lang="en-US" smtClean="0"/>
-              <a:t>10/1/2023</a:t>
+              <a:t>10/15/2023</a:t>
             </a:fld>
             <a:endParaRPr lang="en-US" dirty="0"/>
           </a:p>
@@ -14328,7 +14343,7 @@
           <a:p>
             <a:fld id="{8F422B43-45D4-4608-9F03-122930498C43}" type="datetime1">
               <a:rPr lang="en-US" smtClean="0"/>
-              <a:t>10/1/2023</a:t>
+              <a:t>10/15/2023</a:t>
             </a:fld>
             <a:endParaRPr lang="en-US" dirty="0"/>
           </a:p>
@@ -15167,6 +15182,7 @@
                 <a:solidFill>
                   <a:schemeClr val="bg1"/>
                 </a:solidFill>
+                <a:hlinkClick r:id="rId4"/>
               </a:rPr>
               <a:t>REA provides process documentation </a:t>
             </a:r>
@@ -15175,9 +15191,15 @@
                 <a:solidFill>
                   <a:schemeClr val="bg1"/>
                 </a:solidFill>
+                <a:hlinkClick r:id="rId4"/>
               </a:rPr>
               <a:t>mapping the SAG™ process and methods to the NIST CSF for inclusion in SEC process documentation disclosures</a:t>
             </a:r>
+            <a:endParaRPr lang="en-US" dirty="0">
+              <a:solidFill>
+                <a:schemeClr val="bg1"/>
+              </a:solidFill>
+            </a:endParaRPr>
           </a:p>
         </p:txBody>
       </p:sp>
@@ -15204,7 +15226,7 @@
           <a:p>
             <a:fld id="{8F422B43-45D4-4608-9F03-122930498C43}" type="datetime1">
               <a:rPr lang="en-US" smtClean="0"/>
-              <a:t>10/1/2023</a:t>
+              <a:t>10/15/2023</a:t>
             </a:fld>
             <a:endParaRPr lang="en-US" dirty="0"/>
           </a:p>
@@ -15366,8 +15388,17 @@
                 <a:solidFill>
                   <a:schemeClr val="bg1"/>
                 </a:solidFill>
+                <a:hlinkClick r:id="rId2"/>
               </a:rPr>
-              <a:t>Minimum Implementation (Typical Case: 40 Hours with Customer Commitment)</a:t>
+              <a:t>Minimum Implementation </a:t>
+            </a:r>
+            <a:r>
+              <a:rPr lang="en-US" dirty="0">
+                <a:solidFill>
+                  <a:schemeClr val="bg1"/>
+                </a:solidFill>
+              </a:rPr>
+              <a:t>(Typical Case: 40 Hours with Customer Commitment)</a:t>
             </a:r>
           </a:p>
           <a:p>
@@ -15495,7 +15526,7 @@
           <a:p>
             <a:fld id="{8F422B43-45D4-4608-9F03-122930498C43}" type="datetime1">
               <a:rPr lang="en-US" smtClean="0"/>
-              <a:t>10/1/2023</a:t>
+              <a:t>10/15/2023</a:t>
             </a:fld>
             <a:endParaRPr lang="en-US" dirty="0"/>
           </a:p>
@@ -15675,17 +15706,26 @@
                 <a:solidFill>
                   <a:schemeClr val="bg1"/>
                 </a:solidFill>
+                <a:hlinkClick r:id="rId3"/>
               </a:rPr>
-              <a:t>Perform a software supply chain risk assessment and detection process following best practices provided by NIST (SP 800-161) </a:t>
-            </a:r>
-          </a:p>
-          <a:p>
+              <a:t>Perform a software supply chain risk assessment and detection process</a:t>
+            </a:r>
             <a:r>
               <a:rPr lang="en-US" sz="1800" dirty="0">
                 <a:solidFill>
                   <a:schemeClr val="bg1"/>
                 </a:solidFill>
-                <a:hlinkClick r:id="rId3"/>
+              </a:rPr>
+              <a:t> following best practices provided by NIST (SP 800-161) </a:t>
+            </a:r>
+          </a:p>
+          <a:p>
+            <a:r>
+              <a:rPr lang="en-US" sz="1800" dirty="0">
+                <a:solidFill>
+                  <a:schemeClr val="bg1"/>
+                </a:solidFill>
+                <a:hlinkClick r:id="rId4"/>
               </a:rPr>
               <a:t>Preserve tamper-proof evidence</a:t>
             </a:r>
@@ -15720,7 +15760,7 @@
                 <a:solidFill>
                   <a:schemeClr val="bg1"/>
                 </a:solidFill>
-                <a:hlinkClick r:id="rId4"/>
+                <a:hlinkClick r:id="rId5"/>
               </a:rPr>
               <a:t>Vendor Response Form (VRF) </a:t>
             </a:r>
@@ -15739,7 +15779,7 @@
                 <a:solidFill>
                   <a:schemeClr val="bg1"/>
                 </a:solidFill>
-                <a:hlinkClick r:id="rId5"/>
+                <a:hlinkClick r:id="rId6"/>
               </a:rPr>
               <a:t>Produce process disclosure documentation for software supply chain detection controls (CISA KEV) for SEC cybersecurity disclosure on Form 10-K and preserve tamp-proof evidence </a:t>
             </a:r>
@@ -15758,7 +15798,7 @@
                 <a:solidFill>
                   <a:schemeClr val="bg1"/>
                 </a:solidFill>
-                <a:hlinkClick r:id="rId6"/>
+                <a:hlinkClick r:id="rId7"/>
               </a:rPr>
               <a:t>Watch Joe Sullivan 9/26/23 interview, UBER convicted CISO following cyber-incident</a:t>
             </a:r>
@@ -15781,7 +15821,7 @@
                 <a:solidFill>
                   <a:schemeClr val="bg1"/>
                 </a:solidFill>
-                <a:hlinkClick r:id="rId7"/>
+                <a:hlinkClick r:id="rId8"/>
               </a:rPr>
               <a:t>Never trust software, always verify and report! ™</a:t>
             </a:r>
@@ -15816,7 +15856,7 @@
           <a:p>
             <a:fld id="{8F422B43-45D4-4608-9F03-122930498C43}" type="datetime1">
               <a:rPr lang="en-US" smtClean="0"/>
-              <a:t>10/1/2023</a:t>
+              <a:t>10/15/2023</a:t>
             </a:fld>
             <a:endParaRPr lang="en-US" dirty="0"/>
           </a:p>
@@ -15971,7 +16011,7 @@
           <a:p>
             <a:fld id="{8F422B43-45D4-4608-9F03-122930498C43}" type="datetime1">
               <a:rPr lang="en-US" smtClean="0"/>
-              <a:t>10/1/2023</a:t>
+              <a:t>10/15/2023</a:t>
             </a:fld>
             <a:endParaRPr lang="en-US" dirty="0"/>
           </a:p>
@@ -16286,8 +16326,17 @@
                 <a:solidFill>
                   <a:schemeClr val="bg1"/>
                 </a:solidFill>
+                <a:hlinkClick r:id="rId2"/>
               </a:rPr>
-              <a:t>Developer of Cybersecurity Risk Assessment Tools for the Software Supply Chain (C-SCRM), SAG-PM™ and SAG-CTR™ for tamper-proof evidence preservation</a:t>
+              <a:t>Developer of Cybersecurity Risk Assessment Tools</a:t>
+            </a:r>
+            <a:r>
+              <a:rPr lang="en-US" dirty="0">
+                <a:solidFill>
+                  <a:schemeClr val="bg1"/>
+                </a:solidFill>
+              </a:rPr>
+              <a:t> for the Software Supply Chain (C-SCRM), SAG-PM™ and SAG-CTR™ for tamper-proof evidence preservation</a:t>
             </a:r>
           </a:p>
           <a:p>
@@ -16335,7 +16384,7 @@
           <a:p>
             <a:fld id="{8F422B43-45D4-4608-9F03-122930498C43}" type="datetime1">
               <a:rPr lang="en-US" smtClean="0"/>
-              <a:t>10/1/2023</a:t>
+              <a:t>10/15/2023</a:t>
             </a:fld>
             <a:endParaRPr lang="en-US" dirty="0"/>
           </a:p>
@@ -16491,7 +16540,7 @@
           <a:p>
             <a:fld id="{8F422B43-45D4-4608-9F03-122930498C43}" type="datetime1">
               <a:rPr lang="en-US" smtClean="0"/>
-              <a:t>10/1/2023</a:t>
+              <a:t>10/15/2023</a:t>
             </a:fld>
             <a:endParaRPr lang="en-US" dirty="0"/>
           </a:p>
@@ -16645,9 +16694,15 @@
                 <a:solidFill>
                   <a:schemeClr val="bg1"/>
                 </a:solidFill>
+                <a:hlinkClick r:id="rId2"/>
               </a:rPr>
               <a:t>Don’t be this guy – Avoid the Icebergs</a:t>
             </a:r>
+            <a:endParaRPr lang="en-US" dirty="0">
+              <a:solidFill>
+                <a:schemeClr val="bg1"/>
+              </a:solidFill>
+            </a:endParaRPr>
           </a:p>
         </p:txBody>
       </p:sp>
@@ -16674,7 +16729,7 @@
           <a:p>
             <a:fld id="{8F422B43-45D4-4608-9F03-122930498C43}" type="datetime1">
               <a:rPr lang="en-US" smtClean="0"/>
-              <a:t>10/1/2023</a:t>
+              <a:t>10/15/2023</a:t>
             </a:fld>
             <a:endParaRPr lang="en-US" dirty="0"/>
           </a:p>
@@ -16753,7 +16808,7 @@
           <p:nvPr/>
         </p:nvPicPr>
         <p:blipFill>
-          <a:blip r:embed="rId2"/>
+          <a:blip r:embed="rId3"/>
           <a:stretch>
             <a:fillRect/>
           </a:stretch>
@@ -16802,7 +16857,7 @@
             </a:r>
             <a:r>
               <a:rPr lang="en-US" dirty="0">
-                <a:hlinkClick r:id="rId3"/>
+                <a:hlinkClick r:id="rId4"/>
               </a:rPr>
               <a:t>https://www.youtube.com/watch?v=CKAZAh5icPQ</a:t>
             </a:r>
@@ -16903,7 +16958,7 @@
           <a:p>
             <a:fld id="{8F422B43-45D4-4608-9F03-122930498C43}" type="datetime1">
               <a:rPr lang="en-US" smtClean="0"/>
-              <a:t>10/1/2023</a:t>
+              <a:t>10/15/2023</a:t>
             </a:fld>
             <a:endParaRPr lang="en-US" dirty="0"/>
           </a:p>
@@ -17167,7 +17222,7 @@
           <a:p>
             <a:fld id="{8F422B43-45D4-4608-9F03-122930498C43}" type="datetime1">
               <a:rPr lang="en-US" smtClean="0"/>
-              <a:t>10/1/2023</a:t>
+              <a:t>10/15/2023</a:t>
             </a:fld>
             <a:endParaRPr lang="en-US" dirty="0"/>
           </a:p>
@@ -17621,7 +17676,7 @@
           <a:p>
             <a:fld id="{24ED1F1F-89F4-49B5-8EEC-B205C98801EE}" type="datetime1">
               <a:rPr lang="en-US" smtClean="0"/>
-              <a:t>10/1/2023</a:t>
+              <a:t>10/15/2023</a:t>
             </a:fld>
             <a:endParaRPr lang="en-US" dirty="0"/>
           </a:p>
@@ -17742,7 +17797,7 @@
           <a:p>
             <a:fld id="{8F422B43-45D4-4608-9F03-122930498C43}" type="datetime1">
               <a:rPr lang="en-US" smtClean="0"/>
-              <a:t>10/1/2023</a:t>
+              <a:t>10/15/2023</a:t>
             </a:fld>
             <a:endParaRPr lang="en-US" dirty="0"/>
           </a:p>
@@ -17985,6 +18040,7 @@
                   <a:srgbClr val="000000"/>
                 </a:solidFill>
                 <a:latin typeface="Arial" panose="020B0604020202020204" pitchFamily="34" charset="0"/>
+                <a:hlinkClick r:id="rId2"/>
               </a:rPr>
               <a:t>Describe </a:t>
             </a:r>
@@ -17994,6 +18050,7 @@
                   <a:srgbClr val="000000"/>
                 </a:solidFill>
                 <a:latin typeface="Arial" panose="020B0604020202020204" pitchFamily="34" charset="0"/>
+                <a:hlinkClick r:id="rId2"/>
               </a:rPr>
               <a:t>the</a:t>
             </a:r>
@@ -18003,9 +18060,16 @@
                   <a:srgbClr val="000000"/>
                 </a:solidFill>
                 <a:latin typeface="Arial" panose="020B0604020202020204" pitchFamily="34" charset="0"/>
+                <a:hlinkClick r:id="rId2"/>
               </a:rPr>
               <a:t> processes and practices for cyber-risk detection within the software supply chain</a:t>
             </a:r>
+            <a:endParaRPr lang="en-US" sz="2800" b="0" i="0" strike="noStrike" baseline="0" dirty="0">
+              <a:solidFill>
+                <a:srgbClr val="000000"/>
+              </a:solidFill>
+              <a:latin typeface="Arial" panose="020B0604020202020204" pitchFamily="34" charset="0"/>
+            </a:endParaRPr>
           </a:p>
           <a:p>
             <a:r>
@@ -18065,7 +18129,7 @@
           <a:p>
             <a:fld id="{8F422B43-45D4-4608-9F03-122930498C43}" type="datetime1">
               <a:rPr lang="en-US" smtClean="0"/>
-              <a:t>10/1/2023</a:t>
+              <a:t>10/15/2023</a:t>
             </a:fld>
             <a:endParaRPr lang="en-US" dirty="0"/>
           </a:p>
@@ -18322,8 +18386,17 @@
                 <a:solidFill>
                   <a:schemeClr val="bg1"/>
                 </a:solidFill>
+                <a:hlinkClick r:id="rId5"/>
               </a:rPr>
-              <a:t>Documented processes (disclosures) and tamper-proof evidence of these controls will be vital in any shareholder lawsuits aiming to hold officers with fiduciary duties personally liable</a:t>
+              <a:t>Documented processes (disclosures) </a:t>
+            </a:r>
+            <a:r>
+              <a:rPr lang="en-US" dirty="0">
+                <a:solidFill>
+                  <a:schemeClr val="bg1"/>
+                </a:solidFill>
+              </a:rPr>
+              <a:t>and tamper-proof evidence of these controls will be vital in any shareholder lawsuits aiming to hold officers with fiduciary duties personally liable</a:t>
             </a:r>
           </a:p>
           <a:p>
@@ -18358,7 +18431,7 @@
           <a:p>
             <a:fld id="{8F422B43-45D4-4608-9F03-122930498C43}" type="datetime1">
               <a:rPr lang="en-US" smtClean="0"/>
-              <a:t>10/1/2023</a:t>
+              <a:t>10/15/2023</a:t>
             </a:fld>
             <a:endParaRPr lang="en-US" dirty="0"/>
           </a:p>
@@ -18513,7 +18586,7 @@
           <a:p>
             <a:fld id="{8F422B43-45D4-4608-9F03-122930498C43}" type="datetime1">
               <a:rPr lang="en-US" smtClean="0"/>
-              <a:t>10/1/2023</a:t>
+              <a:t>10/15/2023</a:t>
             </a:fld>
             <a:endParaRPr lang="en-US" dirty="0"/>
           </a:p>
@@ -18729,7 +18802,7 @@
           <a:p>
             <a:fld id="{8F422B43-45D4-4608-9F03-122930498C43}" type="datetime1">
               <a:rPr lang="en-US" smtClean="0"/>
-              <a:t>10/1/2023</a:t>
+              <a:t>10/15/2023</a:t>
             </a:fld>
             <a:endParaRPr lang="en-US" dirty="0"/>
           </a:p>
@@ -19049,7 +19122,7 @@
           <a:p>
             <a:fld id="{8F422B43-45D4-4608-9F03-122930498C43}" type="datetime1">
               <a:rPr lang="en-US" smtClean="0"/>
-              <a:t>10/1/2023</a:t>
+              <a:t>10/15/2023</a:t>
             </a:fld>
             <a:endParaRPr lang="en-US" dirty="0"/>
           </a:p>

</xml_diff>